<commit_message>
A few small changes in the presentation
</commit_message>
<xml_diff>
--- a/Progress Report/Presentation.pptx
+++ b/Progress Report/Presentation.pptx
@@ -5,22 +5,23 @@
     <p:sldMasterId id="2147483849" r:id="rId1"/>
   </p:sldMasterIdLst>
   <p:notesMasterIdLst>
-    <p:notesMasterId r:id="rId12"/>
+    <p:notesMasterId r:id="rId13"/>
   </p:notesMasterIdLst>
   <p:handoutMasterIdLst>
-    <p:handoutMasterId r:id="rId13"/>
+    <p:handoutMasterId r:id="rId14"/>
   </p:handoutMasterIdLst>
   <p:sldIdLst>
     <p:sldId id="459" r:id="rId2"/>
-    <p:sldId id="557" r:id="rId3"/>
-    <p:sldId id="566" r:id="rId4"/>
-    <p:sldId id="565" r:id="rId5"/>
-    <p:sldId id="560" r:id="rId6"/>
-    <p:sldId id="562" r:id="rId7"/>
-    <p:sldId id="561" r:id="rId8"/>
-    <p:sldId id="563" r:id="rId9"/>
-    <p:sldId id="559" r:id="rId10"/>
-    <p:sldId id="460" r:id="rId11"/>
+    <p:sldId id="258" r:id="rId3"/>
+    <p:sldId id="557" r:id="rId4"/>
+    <p:sldId id="566" r:id="rId5"/>
+    <p:sldId id="565" r:id="rId6"/>
+    <p:sldId id="560" r:id="rId7"/>
+    <p:sldId id="562" r:id="rId8"/>
+    <p:sldId id="561" r:id="rId9"/>
+    <p:sldId id="563" r:id="rId10"/>
+    <p:sldId id="559" r:id="rId11"/>
+    <p:sldId id="460" r:id="rId12"/>
   </p:sldIdLst>
   <p:sldSz cx="12192000" cy="6858000"/>
   <p:notesSz cx="6858000" cy="9144000"/>
@@ -819,6 +820,23 @@
           <a:bodyPr/>
           <a:lstStyle/>
           <a:p>
+            <a:pPr marL="0" marR="0" indent="0" algn="l" defTabSz="914400" rtl="0" eaLnBrk="1" fontAlgn="auto" latinLnBrk="0" hangingPunct="1">
+              <a:lnSpc>
+                <a:spcPct val="100000"/>
+              </a:lnSpc>
+              <a:spcBef>
+                <a:spcPts val="0"/>
+              </a:spcBef>
+              <a:spcAft>
+                <a:spcPts val="0"/>
+              </a:spcAft>
+              <a:buClrTx/>
+              <a:buSzTx/>
+              <a:buFontTx/>
+              <a:buNone/>
+              <a:tabLst/>
+              <a:defRPr/>
+            </a:pPr>
             <a:endParaRPr lang="en-US" dirty="0"/>
           </a:p>
         </p:txBody>
@@ -842,6 +860,91 @@
               <a:rPr lang="en-US" smtClean="0"/>
               <a:pPr/>
               <a:t>10</a:t>
+            </a:fld>
+            <a:endParaRPr lang="en-US" dirty="0"/>
+          </a:p>
+        </p:txBody>
+      </p:sp>
+    </p:spTree>
+    <p:extLst>
+      <p:ext uri="{BB962C8B-B14F-4D97-AF65-F5344CB8AC3E}">
+        <p14:creationId xmlns:p14="http://schemas.microsoft.com/office/powerpoint/2010/main" val="2926276828"/>
+      </p:ext>
+    </p:extLst>
+  </p:cSld>
+  <p:clrMapOvr>
+    <a:masterClrMapping/>
+  </p:clrMapOvr>
+</p:notes>
+</file>
+
+<file path=ppt/notesSlides/notesSlide11.xml><?xml version="1.0" encoding="utf-8"?>
+<p:notes xmlns:a="http://schemas.openxmlformats.org/drawingml/2006/main" xmlns:r="http://schemas.openxmlformats.org/officeDocument/2006/relationships" xmlns:p="http://schemas.openxmlformats.org/presentationml/2006/main">
+  <p:cSld>
+    <p:spTree>
+      <p:nvGrpSpPr>
+        <p:cNvPr id="1" name=""/>
+        <p:cNvGrpSpPr/>
+        <p:nvPr/>
+      </p:nvGrpSpPr>
+      <p:grpSpPr>
+        <a:xfrm>
+          <a:off x="0" y="0"/>
+          <a:ext cx="0" cy="0"/>
+          <a:chOff x="0" y="0"/>
+          <a:chExt cx="0" cy="0"/>
+        </a:xfrm>
+      </p:grpSpPr>
+      <p:sp>
+        <p:nvSpPr>
+          <p:cNvPr id="2" name="Slide Image Placeholder 1"/>
+          <p:cNvSpPr>
+            <a:spLocks noGrp="1" noRot="1" noChangeAspect="1"/>
+          </p:cNvSpPr>
+          <p:nvPr>
+            <p:ph type="sldImg"/>
+          </p:nvPr>
+        </p:nvSpPr>
+        <p:spPr/>
+      </p:sp>
+      <p:sp>
+        <p:nvSpPr>
+          <p:cNvPr id="3" name="Notes Placeholder 2"/>
+          <p:cNvSpPr>
+            <a:spLocks noGrp="1"/>
+          </p:cNvSpPr>
+          <p:nvPr>
+            <p:ph type="body" idx="1"/>
+          </p:nvPr>
+        </p:nvSpPr>
+        <p:spPr/>
+        <p:txBody>
+          <a:bodyPr/>
+          <a:lstStyle/>
+          <a:p>
+            <a:endParaRPr lang="en-US" dirty="0"/>
+          </a:p>
+        </p:txBody>
+      </p:sp>
+      <p:sp>
+        <p:nvSpPr>
+          <p:cNvPr id="4" name="Slide Number Placeholder 3"/>
+          <p:cNvSpPr>
+            <a:spLocks noGrp="1"/>
+          </p:cNvSpPr>
+          <p:nvPr>
+            <p:ph type="sldNum" sz="quarter" idx="10"/>
+          </p:nvPr>
+        </p:nvSpPr>
+        <p:spPr/>
+        <p:txBody>
+          <a:bodyPr/>
+          <a:lstStyle/>
+          <a:p>
+            <a:fld id="{CDF8ECA5-603A-40AE-B593-DEE33610A6A4}" type="slidenum">
+              <a:rPr lang="en-US" smtClean="0"/>
+              <a:pPr/>
+              <a:t>11</a:t>
             </a:fld>
             <a:endParaRPr lang="en-US"/>
           </a:p>
@@ -904,23 +1007,6 @@
           <a:bodyPr/>
           <a:lstStyle/>
           <a:p>
-            <a:pPr marL="0" marR="0" indent="0" algn="l" defTabSz="914400" rtl="0" eaLnBrk="1" fontAlgn="auto" latinLnBrk="0" hangingPunct="1">
-              <a:lnSpc>
-                <a:spcPct val="100000"/>
-              </a:lnSpc>
-              <a:spcBef>
-                <a:spcPts val="0"/>
-              </a:spcBef>
-              <a:spcAft>
-                <a:spcPts val="0"/>
-              </a:spcAft>
-              <a:buClrTx/>
-              <a:buSzTx/>
-              <a:buFontTx/>
-              <a:buNone/>
-              <a:tabLst/>
-              <a:defRPr/>
-            </a:pPr>
             <a:endParaRPr lang="en-US" dirty="0"/>
           </a:p>
         </p:txBody>
@@ -952,7 +1038,7 @@
     </p:spTree>
     <p:extLst>
       <p:ext uri="{BB962C8B-B14F-4D97-AF65-F5344CB8AC3E}">
-        <p14:creationId xmlns:p14="http://schemas.microsoft.com/office/powerpoint/2010/main" val="1656580647"/>
+        <p14:creationId xmlns:p14="http://schemas.microsoft.com/office/powerpoint/2010/main" val="4225747757"/>
       </p:ext>
     </p:extLst>
   </p:cSld>
@@ -1054,7 +1140,7 @@
     </p:spTree>
     <p:extLst>
       <p:ext uri="{BB962C8B-B14F-4D97-AF65-F5344CB8AC3E}">
-        <p14:creationId xmlns:p14="http://schemas.microsoft.com/office/powerpoint/2010/main" val="4070717397"/>
+        <p14:creationId xmlns:p14="http://schemas.microsoft.com/office/powerpoint/2010/main" val="1656580647"/>
       </p:ext>
     </p:extLst>
   </p:cSld>
@@ -1156,7 +1242,7 @@
     </p:spTree>
     <p:extLst>
       <p:ext uri="{BB962C8B-B14F-4D97-AF65-F5344CB8AC3E}">
-        <p14:creationId xmlns:p14="http://schemas.microsoft.com/office/powerpoint/2010/main" val="3322935499"/>
+        <p14:creationId xmlns:p14="http://schemas.microsoft.com/office/powerpoint/2010/main" val="4070717397"/>
       </p:ext>
     </p:extLst>
   </p:cSld>
@@ -1258,7 +1344,7 @@
     </p:spTree>
     <p:extLst>
       <p:ext uri="{BB962C8B-B14F-4D97-AF65-F5344CB8AC3E}">
-        <p14:creationId xmlns:p14="http://schemas.microsoft.com/office/powerpoint/2010/main" val="705198576"/>
+        <p14:creationId xmlns:p14="http://schemas.microsoft.com/office/powerpoint/2010/main" val="3322935499"/>
       </p:ext>
     </p:extLst>
   </p:cSld>
@@ -1360,7 +1446,7 @@
     </p:spTree>
     <p:extLst>
       <p:ext uri="{BB962C8B-B14F-4D97-AF65-F5344CB8AC3E}">
-        <p14:creationId xmlns:p14="http://schemas.microsoft.com/office/powerpoint/2010/main" val="2800140662"/>
+        <p14:creationId xmlns:p14="http://schemas.microsoft.com/office/powerpoint/2010/main" val="705198576"/>
       </p:ext>
     </p:extLst>
   </p:cSld>
@@ -1462,7 +1548,7 @@
     </p:spTree>
     <p:extLst>
       <p:ext uri="{BB962C8B-B14F-4D97-AF65-F5344CB8AC3E}">
-        <p14:creationId xmlns:p14="http://schemas.microsoft.com/office/powerpoint/2010/main" val="836668695"/>
+        <p14:creationId xmlns:p14="http://schemas.microsoft.com/office/powerpoint/2010/main" val="2800140662"/>
       </p:ext>
     </p:extLst>
   </p:cSld>
@@ -1564,7 +1650,7 @@
     </p:spTree>
     <p:extLst>
       <p:ext uri="{BB962C8B-B14F-4D97-AF65-F5344CB8AC3E}">
-        <p14:creationId xmlns:p14="http://schemas.microsoft.com/office/powerpoint/2010/main" val="2344721366"/>
+        <p14:creationId xmlns:p14="http://schemas.microsoft.com/office/powerpoint/2010/main" val="836668695"/>
       </p:ext>
     </p:extLst>
   </p:cSld>
@@ -1666,7 +1752,7 @@
     </p:spTree>
     <p:extLst>
       <p:ext uri="{BB962C8B-B14F-4D97-AF65-F5344CB8AC3E}">
-        <p14:creationId xmlns:p14="http://schemas.microsoft.com/office/powerpoint/2010/main" val="2926276828"/>
+        <p14:creationId xmlns:p14="http://schemas.microsoft.com/office/powerpoint/2010/main" val="2344721366"/>
       </p:ext>
     </p:extLst>
   </p:cSld>
@@ -8309,6 +8395,586 @@
             <a:lstStyle/>
             <a:p>
               <a:pPr algn="ctr"/>
+              <a:endParaRPr lang="en-US" dirty="0"/>
+            </a:p>
+          </p:txBody>
+        </p:sp>
+        <p:sp>
+          <p:nvSpPr>
+            <p:cNvPr id="8" name="Rectangle 7"/>
+            <p:cNvSpPr/>
+            <p:nvPr/>
+          </p:nvSpPr>
+          <p:spPr>
+            <a:xfrm>
+              <a:off x="239696" y="213044"/>
+              <a:ext cx="11700769" cy="6427453"/>
+            </a:xfrm>
+            <a:prstGeom prst="rect">
+              <a:avLst/>
+            </a:prstGeom>
+            <a:solidFill>
+              <a:schemeClr val="tx1"/>
+            </a:solidFill>
+            <a:ln>
+              <a:noFill/>
+            </a:ln>
+            <a:effectLst>
+              <a:outerShdw blurRad="50800" dist="38100" dir="2700000" algn="tl" rotWithShape="0">
+                <a:prstClr val="black">
+                  <a:alpha val="40000"/>
+                </a:prstClr>
+              </a:outerShdw>
+            </a:effectLst>
+          </p:spPr>
+          <p:style>
+            <a:lnRef idx="2">
+              <a:schemeClr val="accent1">
+                <a:shade val="50000"/>
+              </a:schemeClr>
+            </a:lnRef>
+            <a:fillRef idx="1">
+              <a:schemeClr val="accent1"/>
+            </a:fillRef>
+            <a:effectRef idx="0">
+              <a:schemeClr val="accent1"/>
+            </a:effectRef>
+            <a:fontRef idx="minor">
+              <a:schemeClr val="lt1"/>
+            </a:fontRef>
+          </p:style>
+          <p:txBody>
+            <a:bodyPr rtlCol="0" anchor="ctr"/>
+            <a:lstStyle/>
+            <a:p>
+              <a:pPr algn="ctr"/>
+              <a:endParaRPr lang="en-US" dirty="0"/>
+            </a:p>
+          </p:txBody>
+        </p:sp>
+        <p:sp>
+          <p:nvSpPr>
+            <p:cNvPr id="9" name="Rectangle 8"/>
+            <p:cNvSpPr/>
+            <p:nvPr/>
+          </p:nvSpPr>
+          <p:spPr>
+            <a:xfrm>
+              <a:off x="239696" y="213044"/>
+              <a:ext cx="11700769" cy="6427453"/>
+            </a:xfrm>
+            <a:prstGeom prst="rect">
+              <a:avLst/>
+            </a:prstGeom>
+            <a:solidFill>
+              <a:schemeClr val="tx1"/>
+            </a:solidFill>
+            <a:ln>
+              <a:noFill/>
+            </a:ln>
+            <a:effectLst>
+              <a:outerShdw blurRad="50800" dist="38100" dir="13500000" algn="br" rotWithShape="0">
+                <a:prstClr val="black">
+                  <a:alpha val="40000"/>
+                </a:prstClr>
+              </a:outerShdw>
+            </a:effectLst>
+          </p:spPr>
+          <p:style>
+            <a:lnRef idx="2">
+              <a:schemeClr val="accent1">
+                <a:shade val="50000"/>
+              </a:schemeClr>
+            </a:lnRef>
+            <a:fillRef idx="1">
+              <a:schemeClr val="accent1"/>
+            </a:fillRef>
+            <a:effectRef idx="0">
+              <a:schemeClr val="accent1"/>
+            </a:effectRef>
+            <a:fontRef idx="minor">
+              <a:schemeClr val="lt1"/>
+            </a:fontRef>
+          </p:style>
+          <p:txBody>
+            <a:bodyPr rtlCol="0" anchor="ctr"/>
+            <a:lstStyle/>
+            <a:p>
+              <a:pPr algn="ctr"/>
+              <a:endParaRPr lang="en-US" dirty="0"/>
+            </a:p>
+          </p:txBody>
+        </p:sp>
+        <p:sp>
+          <p:nvSpPr>
+            <p:cNvPr id="10" name="Rectangle 9"/>
+            <p:cNvSpPr/>
+            <p:nvPr/>
+          </p:nvSpPr>
+          <p:spPr>
+            <a:xfrm>
+              <a:off x="10352540" y="213044"/>
+              <a:ext cx="751840" cy="1056956"/>
+            </a:xfrm>
+            <a:prstGeom prst="rect">
+              <a:avLst/>
+            </a:prstGeom>
+            <a:gradFill flip="none" rotWithShape="1">
+              <a:gsLst>
+                <a:gs pos="0">
+                  <a:srgbClr val="1E5C89">
+                    <a:shade val="30000"/>
+                    <a:satMod val="115000"/>
+                  </a:srgbClr>
+                </a:gs>
+                <a:gs pos="50000">
+                  <a:srgbClr val="1E5C89">
+                    <a:shade val="67500"/>
+                    <a:satMod val="115000"/>
+                  </a:srgbClr>
+                </a:gs>
+                <a:gs pos="100000">
+                  <a:srgbClr val="1E5C89">
+                    <a:shade val="100000"/>
+                    <a:satMod val="115000"/>
+                  </a:srgbClr>
+                </a:gs>
+              </a:gsLst>
+              <a:lin ang="5400000" scaled="1"/>
+              <a:tileRect/>
+            </a:gradFill>
+            <a:ln>
+              <a:noFill/>
+            </a:ln>
+          </p:spPr>
+          <p:style>
+            <a:lnRef idx="2">
+              <a:schemeClr val="accent1">
+                <a:shade val="50000"/>
+              </a:schemeClr>
+            </a:lnRef>
+            <a:fillRef idx="1">
+              <a:schemeClr val="accent1"/>
+            </a:fillRef>
+            <a:effectRef idx="0">
+              <a:schemeClr val="accent1"/>
+            </a:effectRef>
+            <a:fontRef idx="minor">
+              <a:schemeClr val="lt1"/>
+            </a:fontRef>
+          </p:style>
+          <p:txBody>
+            <a:bodyPr rtlCol="0" anchor="ctr"/>
+            <a:lstStyle/>
+            <a:p>
+              <a:pPr algn="ctr"/>
+              <a:endParaRPr lang="en-US" dirty="0"/>
+            </a:p>
+          </p:txBody>
+        </p:sp>
+      </p:grpSp>
+      <p:sp>
+        <p:nvSpPr>
+          <p:cNvPr id="4" name="Slide Number Placeholder 3"/>
+          <p:cNvSpPr>
+            <a:spLocks noGrp="1"/>
+          </p:cNvSpPr>
+          <p:nvPr>
+            <p:ph type="sldNum" sz="quarter" idx="12"/>
+          </p:nvPr>
+        </p:nvSpPr>
+        <p:spPr>
+          <a:xfrm>
+            <a:off x="10311900" y="295729"/>
+            <a:ext cx="838199" cy="767687"/>
+          </a:xfrm>
+        </p:spPr>
+        <p:txBody>
+          <a:bodyPr/>
+          <a:lstStyle/>
+          <a:p>
+            <a:fld id="{6D22F896-40B5-4ADD-8801-0D06FADFA095}" type="slidenum">
+              <a:rPr lang="en-US" smtClean="0"/>
+              <a:pPr/>
+              <a:t>10</a:t>
+            </a:fld>
+            <a:endParaRPr lang="en-US" dirty="0"/>
+          </a:p>
+        </p:txBody>
+      </p:sp>
+      <p:sp>
+        <p:nvSpPr>
+          <p:cNvPr id="3" name="Content Placeholder 2"/>
+          <p:cNvSpPr>
+            <a:spLocks noGrp="1"/>
+          </p:cNvSpPr>
+          <p:nvPr>
+            <p:ph idx="1"/>
+          </p:nvPr>
+        </p:nvSpPr>
+        <p:spPr>
+          <a:xfrm>
+            <a:off x="517586" y="1500996"/>
+            <a:ext cx="10632514" cy="4874403"/>
+          </a:xfrm>
+        </p:spPr>
+        <p:txBody>
+          <a:bodyPr>
+            <a:noAutofit/>
+          </a:bodyPr>
+          <a:lstStyle/>
+          <a:p>
+            <a:pPr algn="just">
+              <a:spcAft>
+                <a:spcPts val="2500"/>
+              </a:spcAft>
+              <a:buClr>
+                <a:schemeClr val="accent1">
+                  <a:lumMod val="75000"/>
+                </a:schemeClr>
+              </a:buClr>
+              <a:buSzPct val="75000"/>
+              <a:buFont typeface="Courier New" panose="02070309020205020404" pitchFamily="49" charset="0"/>
+              <a:buChar char="o"/>
+            </a:pPr>
+            <a:r>
+              <a:rPr lang="en-US" sz="2400" dirty="0">
+                <a:solidFill>
+                  <a:schemeClr val="bg1"/>
+                </a:solidFill>
+                <a:latin typeface="Calibri Light" panose="020F0302020204030204" pitchFamily="34" charset="0"/>
+                <a:cs typeface="Calibri Light" panose="020F0302020204030204" pitchFamily="34" charset="0"/>
+              </a:rPr>
+              <a:t>Implement chord-class (i.e. extract the set of all chords in the track) and chord-sequence embedding (i.e. extract the set of all sequences of chords of length N). </a:t>
+            </a:r>
+          </a:p>
+          <a:p>
+            <a:pPr algn="just">
+              <a:spcAft>
+                <a:spcPts val="2500"/>
+              </a:spcAft>
+              <a:buClr>
+                <a:schemeClr val="accent1">
+                  <a:lumMod val="75000"/>
+                </a:schemeClr>
+              </a:buClr>
+              <a:buSzPct val="75000"/>
+              <a:buFont typeface="Courier New" panose="02070309020205020404" pitchFamily="49" charset="0"/>
+              <a:buChar char="o"/>
+            </a:pPr>
+            <a:r>
+              <a:rPr lang="en-US" sz="2400" dirty="0">
+                <a:solidFill>
+                  <a:schemeClr val="bg1"/>
+                </a:solidFill>
+                <a:latin typeface="Calibri Light" panose="020F0302020204030204" pitchFamily="34" charset="0"/>
+                <a:cs typeface="Calibri Light" panose="020F0302020204030204" pitchFamily="34" charset="0"/>
+              </a:rPr>
+              <a:t>Formulating the distance measure for the above two embeddings. </a:t>
+            </a:r>
+          </a:p>
+          <a:p>
+            <a:pPr algn="just">
+              <a:spcAft>
+                <a:spcPts val="2500"/>
+              </a:spcAft>
+              <a:buClr>
+                <a:schemeClr val="accent1">
+                  <a:lumMod val="75000"/>
+                </a:schemeClr>
+              </a:buClr>
+              <a:buSzPct val="75000"/>
+              <a:buFont typeface="Courier New" panose="02070309020205020404" pitchFamily="49" charset="0"/>
+              <a:buChar char="o"/>
+            </a:pPr>
+            <a:r>
+              <a:rPr lang="en-US" sz="2400" dirty="0">
+                <a:solidFill>
+                  <a:schemeClr val="bg1"/>
+                </a:solidFill>
+                <a:latin typeface="Calibri Light" panose="020F0302020204030204" pitchFamily="34" charset="0"/>
+                <a:cs typeface="Calibri Light" panose="020F0302020204030204" pitchFamily="34" charset="0"/>
+              </a:rPr>
+              <a:t>Use machine learning algorithms along with neural networks for the artist and genre classification based on the songs.</a:t>
+            </a:r>
+          </a:p>
+          <a:p>
+            <a:pPr algn="just">
+              <a:spcAft>
+                <a:spcPts val="2500"/>
+              </a:spcAft>
+              <a:buClr>
+                <a:schemeClr val="accent1">
+                  <a:lumMod val="75000"/>
+                </a:schemeClr>
+              </a:buClr>
+              <a:buSzPct val="75000"/>
+              <a:buFont typeface="Courier New" panose="02070309020205020404" pitchFamily="49" charset="0"/>
+              <a:buChar char="o"/>
+            </a:pPr>
+            <a:r>
+              <a:rPr lang="en-US" sz="2400" dirty="0">
+                <a:solidFill>
+                  <a:schemeClr val="bg1"/>
+                </a:solidFill>
+                <a:latin typeface="Calibri Light" panose="020F0302020204030204" pitchFamily="34" charset="0"/>
+                <a:cs typeface="Calibri Light" panose="020F0302020204030204" pitchFamily="34" charset="0"/>
+              </a:rPr>
+              <a:t>Identifying the common chord progressions in popular music.</a:t>
+            </a:r>
+          </a:p>
+          <a:p>
+            <a:pPr algn="just">
+              <a:spcAft>
+                <a:spcPts val="2500"/>
+              </a:spcAft>
+              <a:buClr>
+                <a:schemeClr val="accent1">
+                  <a:lumMod val="75000"/>
+                </a:schemeClr>
+              </a:buClr>
+              <a:buSzPct val="75000"/>
+              <a:buFont typeface="Courier New" panose="02070309020205020404" pitchFamily="49" charset="0"/>
+              <a:buChar char="o"/>
+            </a:pPr>
+            <a:endParaRPr lang="en-US" sz="2400" dirty="0">
+              <a:solidFill>
+                <a:schemeClr val="bg1"/>
+              </a:solidFill>
+              <a:latin typeface="Calibri Light" panose="020F0302020204030204" pitchFamily="34" charset="0"/>
+              <a:cs typeface="Calibri Light" panose="020F0302020204030204" pitchFamily="34" charset="0"/>
+            </a:endParaRPr>
+          </a:p>
+          <a:p>
+            <a:pPr algn="just">
+              <a:spcAft>
+                <a:spcPts val="2500"/>
+              </a:spcAft>
+              <a:buClr>
+                <a:schemeClr val="accent1">
+                  <a:lumMod val="75000"/>
+                </a:schemeClr>
+              </a:buClr>
+              <a:buSzPct val="75000"/>
+              <a:buFont typeface="Courier New" panose="02070309020205020404" pitchFamily="49" charset="0"/>
+              <a:buChar char="o"/>
+            </a:pPr>
+            <a:endParaRPr lang="en-US" sz="2400" dirty="0">
+              <a:solidFill>
+                <a:schemeClr val="bg1"/>
+              </a:solidFill>
+              <a:latin typeface="Calibri Light" panose="020F0302020204030204" pitchFamily="34" charset="0"/>
+              <a:cs typeface="Calibri Light" panose="020F0302020204030204" pitchFamily="34" charset="0"/>
+            </a:endParaRPr>
+          </a:p>
+          <a:p>
+            <a:pPr algn="just">
+              <a:spcAft>
+                <a:spcPts val="2500"/>
+              </a:spcAft>
+              <a:buClr>
+                <a:schemeClr val="accent1">
+                  <a:lumMod val="75000"/>
+                </a:schemeClr>
+              </a:buClr>
+              <a:buSzPct val="75000"/>
+              <a:buFont typeface="Courier New" panose="02070309020205020404" pitchFamily="49" charset="0"/>
+              <a:buChar char="o"/>
+            </a:pPr>
+            <a:endParaRPr lang="en-US" sz="2400" dirty="0">
+              <a:solidFill>
+                <a:schemeClr val="bg1"/>
+              </a:solidFill>
+              <a:latin typeface="Calibri Light" panose="020F0302020204030204" pitchFamily="34" charset="0"/>
+              <a:cs typeface="Calibri Light" panose="020F0302020204030204" pitchFamily="34" charset="0"/>
+            </a:endParaRPr>
+          </a:p>
+        </p:txBody>
+      </p:sp>
+      <p:sp>
+        <p:nvSpPr>
+          <p:cNvPr id="11" name="Title 1"/>
+          <p:cNvSpPr txBox="1">
+            <a:spLocks/>
+          </p:cNvSpPr>
+          <p:nvPr/>
+        </p:nvSpPr>
+        <p:spPr>
+          <a:xfrm>
+            <a:off x="639297" y="452694"/>
+            <a:ext cx="10911245" cy="762000"/>
+          </a:xfrm>
+          <a:prstGeom prst="rect">
+            <a:avLst/>
+          </a:prstGeom>
+        </p:spPr>
+        <p:txBody>
+          <a:bodyPr vert="horz" lIns="91440" tIns="45720" rIns="91440" bIns="45720" rtlCol="0" anchor="t">
+            <a:noAutofit/>
+          </a:bodyPr>
+          <a:lstStyle/>
+          <a:p>
+            <a:pPr marL="0" marR="0" lvl="0" indent="0" defTabSz="457200" rtl="0" eaLnBrk="1" fontAlgn="auto" latinLnBrk="0" hangingPunct="1">
+              <a:lnSpc>
+                <a:spcPct val="100000"/>
+              </a:lnSpc>
+              <a:spcBef>
+                <a:spcPct val="0"/>
+              </a:spcBef>
+              <a:spcAft>
+                <a:spcPts val="0"/>
+              </a:spcAft>
+              <a:buClrTx/>
+              <a:buSzTx/>
+              <a:buFontTx/>
+              <a:buNone/>
+              <a:tabLst/>
+              <a:defRPr/>
+            </a:pPr>
+            <a:r>
+              <a:rPr lang="en-US" sz="4000" dirty="0">
+                <a:solidFill>
+                  <a:srgbClr val="1E5C89"/>
+                </a:solidFill>
+                <a:effectLst>
+                  <a:outerShdw blurRad="38100" dist="38100" dir="2700000" algn="tl">
+                    <a:srgbClr val="000000">
+                      <a:alpha val="43137"/>
+                    </a:srgbClr>
+                  </a:outerShdw>
+                </a:effectLst>
+                <a:latin typeface="+mj-lt"/>
+                <a:ea typeface="+mj-ea"/>
+                <a:cs typeface="+mj-cs"/>
+              </a:rPr>
+              <a:t>Upcoming Milestones</a:t>
+            </a:r>
+          </a:p>
+        </p:txBody>
+      </p:sp>
+    </p:spTree>
+    <p:extLst>
+      <p:ext uri="{BB962C8B-B14F-4D97-AF65-F5344CB8AC3E}">
+        <p14:creationId xmlns:p14="http://schemas.microsoft.com/office/powerpoint/2010/main" val="1259270546"/>
+      </p:ext>
+    </p:extLst>
+  </p:cSld>
+  <p:clrMapOvr>
+    <a:masterClrMapping/>
+  </p:clrMapOvr>
+</p:sld>
+</file>
+
+<file path=ppt/slides/slide11.xml><?xml version="1.0" encoding="utf-8"?>
+<p:sld xmlns:a="http://schemas.openxmlformats.org/drawingml/2006/main" xmlns:r="http://schemas.openxmlformats.org/officeDocument/2006/relationships" xmlns:p="http://schemas.openxmlformats.org/presentationml/2006/main">
+  <p:cSld>
+    <p:spTree>
+      <p:nvGrpSpPr>
+        <p:cNvPr id="1" name=""/>
+        <p:cNvGrpSpPr/>
+        <p:nvPr/>
+      </p:nvGrpSpPr>
+      <p:grpSpPr>
+        <a:xfrm>
+          <a:off x="0" y="0"/>
+          <a:ext cx="0" cy="0"/>
+          <a:chOff x="0" y="0"/>
+          <a:chExt cx="0" cy="0"/>
+        </a:xfrm>
+      </p:grpSpPr>
+      <p:grpSp>
+        <p:nvGrpSpPr>
+          <p:cNvPr id="5" name="Group 4"/>
+          <p:cNvGrpSpPr/>
+          <p:nvPr/>
+        </p:nvGrpSpPr>
+        <p:grpSpPr>
+          <a:xfrm>
+            <a:off x="0" y="0"/>
+            <a:ext cx="12192000" cy="6858000"/>
+            <a:chOff x="0" y="0"/>
+            <a:chExt cx="12192000" cy="6858000"/>
+          </a:xfrm>
+        </p:grpSpPr>
+        <p:pic>
+          <p:nvPicPr>
+            <p:cNvPr id="6" name="Picture 5"/>
+            <p:cNvPicPr>
+              <a:picLocks noChangeAspect="1"/>
+            </p:cNvPicPr>
+            <p:nvPr/>
+          </p:nvPicPr>
+          <p:blipFill>
+            <a:blip r:embed="rId3">
+              <a:extLst>
+                <a:ext uri="{28A0092B-C50C-407E-A947-70E740481C1C}">
+                  <a14:useLocalDpi xmlns:a14="http://schemas.microsoft.com/office/drawing/2010/main" val="0"/>
+                </a:ext>
+              </a:extLst>
+            </a:blip>
+            <a:stretch>
+              <a:fillRect/>
+            </a:stretch>
+          </p:blipFill>
+          <p:spPr>
+            <a:xfrm>
+              <a:off x="0" y="0"/>
+              <a:ext cx="12192000" cy="6858000"/>
+            </a:xfrm>
+            <a:prstGeom prst="rect">
+              <a:avLst/>
+            </a:prstGeom>
+          </p:spPr>
+        </p:pic>
+        <p:sp>
+          <p:nvSpPr>
+            <p:cNvPr id="7" name="Rectangle 6"/>
+            <p:cNvSpPr/>
+            <p:nvPr/>
+          </p:nvSpPr>
+          <p:spPr>
+            <a:xfrm>
+              <a:off x="125769" y="115410"/>
+              <a:ext cx="11938984" cy="6622741"/>
+            </a:xfrm>
+            <a:prstGeom prst="rect">
+              <a:avLst/>
+            </a:prstGeom>
+            <a:solidFill>
+              <a:srgbClr val="ACD433"/>
+            </a:solidFill>
+            <a:ln>
+              <a:noFill/>
+            </a:ln>
+            <a:effectLst>
+              <a:outerShdw blurRad="50800" dist="38100" dir="2700000" algn="tl" rotWithShape="0">
+                <a:prstClr val="black">
+                  <a:alpha val="40000"/>
+                </a:prstClr>
+              </a:outerShdw>
+            </a:effectLst>
+          </p:spPr>
+          <p:style>
+            <a:lnRef idx="2">
+              <a:schemeClr val="accent1">
+                <a:shade val="50000"/>
+              </a:schemeClr>
+            </a:lnRef>
+            <a:fillRef idx="1">
+              <a:schemeClr val="accent1"/>
+            </a:fillRef>
+            <a:effectRef idx="0">
+              <a:schemeClr val="accent1"/>
+            </a:effectRef>
+            <a:fontRef idx="minor">
+              <a:schemeClr val="lt1"/>
+            </a:fontRef>
+          </p:style>
+          <p:txBody>
+            <a:bodyPr rtlCol="0" anchor="ctr"/>
+            <a:lstStyle/>
+            <a:p>
+              <a:pPr algn="ctr"/>
               <a:endParaRPr lang="en-US"/>
             </a:p>
           </p:txBody>
@@ -8669,7 +9335,7 @@
       </p:grpSpPr>
       <p:grpSp>
         <p:nvGrpSpPr>
-          <p:cNvPr id="5" name="Group 4"/>
+          <p:cNvPr id="14" name="Group 13"/>
           <p:cNvGrpSpPr/>
           <p:nvPr/>
         </p:nvGrpSpPr>
@@ -8683,7 +9349,7 @@
         </p:grpSpPr>
         <p:pic>
           <p:nvPicPr>
-            <p:cNvPr id="6" name="Picture 5"/>
+            <p:cNvPr id="15" name="Picture 14"/>
             <p:cNvPicPr>
               <a:picLocks noChangeAspect="1"/>
             </p:cNvPicPr>
@@ -8713,7 +9379,7 @@
         </p:pic>
         <p:sp>
           <p:nvSpPr>
-            <p:cNvPr id="7" name="Rectangle 6"/>
+            <p:cNvPr id="16" name="Rectangle 15"/>
             <p:cNvSpPr/>
             <p:nvPr/>
           </p:nvSpPr>
@@ -8766,7 +9432,7 @@
         </p:sp>
         <p:sp>
           <p:nvSpPr>
-            <p:cNvPr id="8" name="Rectangle 7"/>
+            <p:cNvPr id="17" name="Rectangle 16"/>
             <p:cNvSpPr/>
             <p:nvPr/>
           </p:nvSpPr>
@@ -8819,7 +9485,7 @@
         </p:sp>
         <p:sp>
           <p:nvSpPr>
-            <p:cNvPr id="9" name="Rectangle 8"/>
+            <p:cNvPr id="18" name="Rectangle 17"/>
             <p:cNvSpPr/>
             <p:nvPr/>
           </p:nvSpPr>
@@ -8872,7 +9538,7 @@
         </p:sp>
         <p:sp>
           <p:nvSpPr>
-            <p:cNvPr id="10" name="Rectangle 9"/>
+            <p:cNvPr id="19" name="Rectangle 18"/>
             <p:cNvSpPr/>
             <p:nvPr/>
           </p:nvSpPr>
@@ -8940,194 +9606,23 @@
       </p:grpSp>
       <p:sp>
         <p:nvSpPr>
-          <p:cNvPr id="4" name="Slide Number Placeholder 3"/>
-          <p:cNvSpPr>
-            <a:spLocks noGrp="1"/>
-          </p:cNvSpPr>
-          <p:nvPr>
-            <p:ph type="sldNum" sz="quarter" idx="12"/>
-          </p:nvPr>
-        </p:nvSpPr>
-        <p:spPr>
-          <a:xfrm>
-            <a:off x="10311900" y="295729"/>
-            <a:ext cx="838199" cy="767687"/>
-          </a:xfrm>
-        </p:spPr>
+          <p:cNvPr id="2" name="Title 1"/>
+          <p:cNvSpPr>
+            <a:spLocks noGrp="1"/>
+          </p:cNvSpPr>
+          <p:nvPr>
+            <p:ph type="title"/>
+          </p:nvPr>
+        </p:nvSpPr>
+        <p:spPr/>
         <p:txBody>
           <a:bodyPr/>
           <a:lstStyle/>
           <a:p>
-            <a:fld id="{6D22F896-40B5-4ADD-8801-0D06FADFA095}" type="slidenum">
-              <a:rPr lang="en-US" smtClean="0"/>
-              <a:pPr/>
-              <a:t>2</a:t>
-            </a:fld>
-            <a:endParaRPr lang="en-US" dirty="0"/>
-          </a:p>
-        </p:txBody>
-      </p:sp>
-      <p:sp>
-        <p:nvSpPr>
-          <p:cNvPr id="3" name="Content Placeholder 2"/>
-          <p:cNvSpPr>
-            <a:spLocks noGrp="1"/>
-          </p:cNvSpPr>
-          <p:nvPr>
-            <p:ph idx="1"/>
-          </p:nvPr>
-        </p:nvSpPr>
-        <p:spPr>
-          <a:xfrm>
-            <a:off x="517586" y="1500996"/>
-            <a:ext cx="10632514" cy="4874403"/>
-          </a:xfrm>
-        </p:spPr>
-        <p:txBody>
-          <a:bodyPr>
-            <a:noAutofit/>
-          </a:bodyPr>
-          <a:lstStyle/>
-          <a:p>
-            <a:pPr algn="just">
-              <a:buFont typeface="Courier New" panose="02070309020205020404" pitchFamily="49" charset="0"/>
-              <a:buChar char="o"/>
-            </a:pPr>
-            <a:r>
-              <a:rPr lang="en-IN" sz="2400" dirty="0">
+            <a:r>
+              <a:rPr lang="en-US" sz="5000" dirty="0">
                 <a:solidFill>
-                  <a:schemeClr val="bg1"/>
-                </a:solidFill>
-                <a:latin typeface="Calibri Light" panose="020F0302020204030204" pitchFamily="34" charset="0"/>
-                <a:cs typeface="Calibri Light" panose="020F0302020204030204" pitchFamily="34" charset="0"/>
-              </a:rPr>
-              <a:t>Music in general is rich in structures. Songs can be viewed as combination of different channels and each channel can be considered as a combination of notes.</a:t>
-            </a:r>
-          </a:p>
-          <a:p>
-            <a:pPr algn="just">
-              <a:buFont typeface="Courier New" panose="02070309020205020404" pitchFamily="49" charset="0"/>
-              <a:buChar char="o"/>
-            </a:pPr>
-            <a:endParaRPr lang="en-IN" sz="2400" dirty="0">
-              <a:solidFill>
-                <a:schemeClr val="bg1"/>
-              </a:solidFill>
-              <a:latin typeface="Calibri Light" panose="020F0302020204030204" pitchFamily="34" charset="0"/>
-              <a:cs typeface="Calibri Light" panose="020F0302020204030204" pitchFamily="34" charset="0"/>
-            </a:endParaRPr>
-          </a:p>
-          <a:p>
-            <a:pPr algn="just">
-              <a:buFont typeface="Courier New" panose="02070309020205020404" pitchFamily="49" charset="0"/>
-              <a:buChar char="o"/>
-            </a:pPr>
-            <a:r>
-              <a:rPr lang="en-IN" sz="2400" dirty="0">
-                <a:solidFill>
-                  <a:schemeClr val="bg1"/>
-                </a:solidFill>
-                <a:latin typeface="Calibri Light" panose="020F0302020204030204" pitchFamily="34" charset="0"/>
-                <a:cs typeface="Calibri Light" panose="020F0302020204030204" pitchFamily="34" charset="0"/>
-              </a:rPr>
-              <a:t>If </a:t>
-            </a:r>
-            <a:r>
-              <a:rPr lang="en-US" sz="2400" dirty="0">
-                <a:solidFill>
-                  <a:schemeClr val="bg1"/>
-                </a:solidFill>
-                <a:latin typeface="Calibri Light" panose="020F0302020204030204" pitchFamily="34" charset="0"/>
-                <a:cs typeface="Calibri Light" panose="020F0302020204030204" pitchFamily="34" charset="0"/>
-              </a:rPr>
-              <a:t>one looks at the sequence of notes that make up a song, one can usually find repeating patterns, for instance, verses will often have exactly the same tune</a:t>
-            </a:r>
-            <a:r>
-              <a:rPr lang="en-IN" sz="2400" dirty="0">
-                <a:solidFill>
-                  <a:schemeClr val="bg1"/>
-                </a:solidFill>
-                <a:latin typeface="Calibri Light" panose="020F0302020204030204" pitchFamily="34" charset="0"/>
-                <a:cs typeface="Calibri Light" panose="020F0302020204030204" pitchFamily="34" charset="0"/>
-              </a:rPr>
-              <a:t>. Observing carefully, it can be observed that certain phrases (or shorter sequence of notes) occur more frequently.</a:t>
-            </a:r>
-          </a:p>
-          <a:p>
-            <a:pPr algn="just">
-              <a:buFont typeface="Courier New" panose="02070309020205020404" pitchFamily="49" charset="0"/>
-              <a:buChar char="o"/>
-            </a:pPr>
-            <a:endParaRPr lang="en-IN" sz="2400" dirty="0">
-              <a:solidFill>
-                <a:schemeClr val="bg1"/>
-              </a:solidFill>
-              <a:latin typeface="Calibri Light" panose="020F0302020204030204" pitchFamily="34" charset="0"/>
-              <a:cs typeface="Calibri Light" panose="020F0302020204030204" pitchFamily="34" charset="0"/>
-            </a:endParaRPr>
-          </a:p>
-          <a:p>
-            <a:pPr algn="just">
-              <a:buFont typeface="Courier New" panose="02070309020205020404" pitchFamily="49" charset="0"/>
-              <a:buChar char="o"/>
-            </a:pPr>
-            <a:r>
-              <a:rPr lang="en-IN" sz="2400" dirty="0">
-                <a:solidFill>
-                  <a:schemeClr val="bg1"/>
-                </a:solidFill>
-                <a:latin typeface="Calibri Light" panose="020F0302020204030204" pitchFamily="34" charset="0"/>
-                <a:cs typeface="Calibri Light" panose="020F0302020204030204" pitchFamily="34" charset="0"/>
-              </a:rPr>
-              <a:t>Notes can be perceived as lying on a circle. Distance between the notes is defined by finding the distances between equivalent nodes (in terms of frequencies).</a:t>
-            </a:r>
-          </a:p>
-        </p:txBody>
-      </p:sp>
-      <p:sp>
-        <p:nvSpPr>
-          <p:cNvPr id="11" name="Title 1"/>
-          <p:cNvSpPr txBox="1">
-            <a:spLocks/>
-          </p:cNvSpPr>
-          <p:nvPr/>
-        </p:nvSpPr>
-        <p:spPr>
-          <a:xfrm>
-            <a:off x="639297" y="452694"/>
-            <a:ext cx="10911245" cy="762000"/>
-          </a:xfrm>
-          <a:prstGeom prst="rect">
-            <a:avLst/>
-          </a:prstGeom>
-        </p:spPr>
-        <p:txBody>
-          <a:bodyPr vert="horz" lIns="91440" tIns="45720" rIns="91440" bIns="45720" rtlCol="0" anchor="t">
-            <a:noAutofit/>
-          </a:bodyPr>
-          <a:lstStyle/>
-          <a:p>
-            <a:pPr marL="0" marR="0" lvl="0" indent="0" defTabSz="457200" rtl="0" eaLnBrk="1" fontAlgn="auto" latinLnBrk="0" hangingPunct="1">
-              <a:lnSpc>
-                <a:spcPct val="100000"/>
-              </a:lnSpc>
-              <a:spcBef>
-                <a:spcPct val="0"/>
-              </a:spcBef>
-              <a:spcAft>
-                <a:spcPts val="0"/>
-              </a:spcAft>
-              <a:buClrTx/>
-              <a:buSzTx/>
-              <a:buFontTx/>
-              <a:buNone/>
-              <a:tabLst/>
-              <a:defRPr/>
-            </a:pPr>
-            <a:r>
-              <a:rPr lang="en-US" sz="4000" dirty="0">
-                <a:solidFill>
-                  <a:srgbClr val="1E5C89"/>
+                  <a:srgbClr val="195080"/>
                 </a:solidFill>
                 <a:effectLst>
                   <a:outerShdw blurRad="38100" dist="38100" dir="2700000" algn="tl">
@@ -9136,19 +9631,262 @@
                     </a:srgbClr>
                   </a:outerShdw>
                 </a:effectLst>
-                <a:latin typeface="+mj-lt"/>
-                <a:ea typeface="+mj-ea"/>
-                <a:cs typeface="+mj-cs"/>
+              </a:rPr>
+              <a:t>Outline</a:t>
+            </a:r>
+          </a:p>
+        </p:txBody>
+      </p:sp>
+      <p:sp>
+        <p:nvSpPr>
+          <p:cNvPr id="3" name="Content Placeholder 2"/>
+          <p:cNvSpPr>
+            <a:spLocks noGrp="1"/>
+          </p:cNvSpPr>
+          <p:nvPr>
+            <p:ph idx="1"/>
+          </p:nvPr>
+        </p:nvSpPr>
+        <p:spPr>
+          <a:xfrm>
+            <a:off x="728663" y="1530722"/>
+            <a:ext cx="10375717" cy="4830749"/>
+          </a:xfrm>
+        </p:spPr>
+        <p:txBody>
+          <a:bodyPr>
+            <a:noAutofit/>
+          </a:bodyPr>
+          <a:lstStyle/>
+          <a:p>
+            <a:pPr>
+              <a:spcAft>
+                <a:spcPts val="1000"/>
+              </a:spcAft>
+              <a:buClr>
+                <a:schemeClr val="accent1">
+                  <a:lumMod val="75000"/>
+                </a:schemeClr>
+              </a:buClr>
+              <a:buSzPct val="75000"/>
+              <a:buFont typeface="Courier New" panose="02070309020205020404" pitchFamily="49" charset="0"/>
+              <a:buChar char="o"/>
+            </a:pPr>
+            <a:r>
+              <a:rPr lang="en-US" sz="2500" dirty="0">
+                <a:solidFill>
+                  <a:schemeClr val="bg1"/>
+                </a:solidFill>
+                <a:latin typeface="Calibri Light" panose="020F0302020204030204" pitchFamily="34" charset="0"/>
               </a:rPr>
               <a:t>Background and Motivation</a:t>
             </a:r>
           </a:p>
-        </p:txBody>
-      </p:sp>
+          <a:p>
+            <a:pPr>
+              <a:spcAft>
+                <a:spcPts val="1000"/>
+              </a:spcAft>
+              <a:buClr>
+                <a:schemeClr val="accent1">
+                  <a:lumMod val="75000"/>
+                </a:schemeClr>
+              </a:buClr>
+              <a:buSzPct val="75000"/>
+              <a:buFont typeface="Courier New" panose="02070309020205020404" pitchFamily="49" charset="0"/>
+              <a:buChar char="o"/>
+            </a:pPr>
+            <a:r>
+              <a:rPr lang="en-US" sz="2500" dirty="0">
+                <a:solidFill>
+                  <a:schemeClr val="bg1"/>
+                </a:solidFill>
+                <a:latin typeface="Calibri Light" panose="020F0302020204030204" pitchFamily="34" charset="0"/>
+              </a:rPr>
+              <a:t>Proposed Tasks</a:t>
+            </a:r>
+          </a:p>
+          <a:p>
+            <a:pPr>
+              <a:spcAft>
+                <a:spcPts val="1000"/>
+              </a:spcAft>
+              <a:buClr>
+                <a:schemeClr val="accent1">
+                  <a:lumMod val="75000"/>
+                </a:schemeClr>
+              </a:buClr>
+              <a:buSzPct val="75000"/>
+              <a:buFont typeface="Courier New" panose="02070309020205020404" pitchFamily="49" charset="0"/>
+              <a:buChar char="o"/>
+            </a:pPr>
+            <a:r>
+              <a:rPr lang="en-US" sz="2500" dirty="0">
+                <a:solidFill>
+                  <a:schemeClr val="bg1"/>
+                </a:solidFill>
+                <a:latin typeface="Calibri Light" panose="020F0302020204030204" pitchFamily="34" charset="0"/>
+              </a:rPr>
+              <a:t>Work done so far</a:t>
+            </a:r>
+            <a:endParaRPr lang="en-US" sz="2500" i="1" dirty="0">
+              <a:solidFill>
+                <a:schemeClr val="bg1"/>
+              </a:solidFill>
+              <a:latin typeface="Calibri Light" panose="020F0302020204030204" pitchFamily="34" charset="0"/>
+            </a:endParaRPr>
+          </a:p>
+          <a:p>
+            <a:pPr>
+              <a:spcAft>
+                <a:spcPts val="1000"/>
+              </a:spcAft>
+              <a:buClr>
+                <a:schemeClr val="accent1">
+                  <a:lumMod val="75000"/>
+                </a:schemeClr>
+              </a:buClr>
+              <a:buSzPct val="75000"/>
+              <a:buFont typeface="Courier New" panose="02070309020205020404" pitchFamily="49" charset="0"/>
+              <a:buChar char="o"/>
+            </a:pPr>
+            <a:r>
+              <a:rPr lang="en-US" sz="2500" dirty="0">
+                <a:solidFill>
+                  <a:schemeClr val="bg1"/>
+                </a:solidFill>
+                <a:latin typeface="Calibri Light" panose="020F0302020204030204" pitchFamily="34" charset="0"/>
+              </a:rPr>
+              <a:t>Procedure – Data Collection Pipeline</a:t>
+            </a:r>
+            <a:endParaRPr lang="en-US" sz="2500" i="1" dirty="0">
+              <a:solidFill>
+                <a:schemeClr val="bg1"/>
+              </a:solidFill>
+              <a:latin typeface="Calibri Light" panose="020F0302020204030204" pitchFamily="34" charset="0"/>
+            </a:endParaRPr>
+          </a:p>
+          <a:p>
+            <a:pPr>
+              <a:spcAft>
+                <a:spcPts val="1000"/>
+              </a:spcAft>
+              <a:buClr>
+                <a:schemeClr val="accent1">
+                  <a:lumMod val="75000"/>
+                </a:schemeClr>
+              </a:buClr>
+              <a:buSzPct val="75000"/>
+              <a:buFont typeface="Courier New" panose="02070309020205020404" pitchFamily="49" charset="0"/>
+              <a:buChar char="o"/>
+            </a:pPr>
+            <a:r>
+              <a:rPr lang="en-US" sz="2500" dirty="0">
+                <a:solidFill>
+                  <a:schemeClr val="bg1"/>
+                </a:solidFill>
+                <a:latin typeface="Calibri Light" panose="020F0302020204030204" pitchFamily="34" charset="0"/>
+              </a:rPr>
+              <a:t>Results</a:t>
+            </a:r>
+          </a:p>
+          <a:p>
+            <a:pPr>
+              <a:spcAft>
+                <a:spcPts val="1000"/>
+              </a:spcAft>
+              <a:buClr>
+                <a:schemeClr val="accent1">
+                  <a:lumMod val="75000"/>
+                </a:schemeClr>
+              </a:buClr>
+              <a:buSzPct val="75000"/>
+              <a:buFont typeface="Courier New" panose="02070309020205020404" pitchFamily="49" charset="0"/>
+              <a:buChar char="o"/>
+            </a:pPr>
+            <a:r>
+              <a:rPr lang="en-US" sz="2500" dirty="0">
+                <a:solidFill>
+                  <a:schemeClr val="bg1"/>
+                </a:solidFill>
+                <a:latin typeface="Calibri Light" panose="020F0302020204030204" pitchFamily="34" charset="0"/>
+              </a:rPr>
+              <a:t>Upcoming Milestones</a:t>
+            </a:r>
+          </a:p>
+        </p:txBody>
+      </p:sp>
+      <p:sp>
+        <p:nvSpPr>
+          <p:cNvPr id="4" name="Slide Number Placeholder 3"/>
+          <p:cNvSpPr>
+            <a:spLocks noGrp="1"/>
+          </p:cNvSpPr>
+          <p:nvPr>
+            <p:ph type="sldNum" sz="quarter" idx="12"/>
+          </p:nvPr>
+        </p:nvSpPr>
+        <p:spPr>
+          <a:xfrm>
+            <a:off x="10309360" y="314519"/>
+            <a:ext cx="838199" cy="767687"/>
+          </a:xfrm>
+        </p:spPr>
+        <p:txBody>
+          <a:bodyPr/>
+          <a:lstStyle/>
+          <a:p>
+            <a:fld id="{6D22F896-40B5-4ADD-8801-0D06FADFA095}" type="slidenum">
+              <a:rPr lang="en-US" smtClean="0">
+                <a:solidFill>
+                  <a:schemeClr val="tx1"/>
+                </a:solidFill>
+              </a:rPr>
+              <a:pPr/>
+              <a:t>2</a:t>
+            </a:fld>
+            <a:endParaRPr lang="en-US" dirty="0">
+              <a:solidFill>
+                <a:schemeClr val="tx1"/>
+              </a:solidFill>
+            </a:endParaRPr>
+          </a:p>
+        </p:txBody>
+      </p:sp>
+      <p:pic>
+        <p:nvPicPr>
+          <p:cNvPr id="5" name="Picture 4"/>
+          <p:cNvPicPr>
+            <a:picLocks noChangeAspect="1"/>
+          </p:cNvPicPr>
+          <p:nvPr/>
+        </p:nvPicPr>
+        <p:blipFill>
+          <a:blip r:embed="rId4">
+            <a:extLst>
+              <a:ext uri="{28A0092B-C50C-407E-A947-70E740481C1C}">
+                <a14:useLocalDpi xmlns:a14="http://schemas.microsoft.com/office/drawing/2010/main" val="0"/>
+              </a:ext>
+            </a:extLst>
+          </a:blip>
+          <a:stretch>
+            <a:fillRect/>
+          </a:stretch>
+        </p:blipFill>
+        <p:spPr>
+          <a:xfrm>
+            <a:off x="7831581" y="1530722"/>
+            <a:ext cx="3272800" cy="4452790"/>
+          </a:xfrm>
+          <a:prstGeom prst="rect">
+            <a:avLst/>
+          </a:prstGeom>
+        </p:spPr>
+      </p:pic>
     </p:spTree>
     <p:extLst>
       <p:ext uri="{BB962C8B-B14F-4D97-AF65-F5344CB8AC3E}">
-        <p14:creationId xmlns:p14="http://schemas.microsoft.com/office/powerpoint/2010/main" val="3848863018"/>
+        <p14:creationId xmlns:p14="http://schemas.microsoft.com/office/powerpoint/2010/main" val="4086274224"/>
       </p:ext>
     </p:extLst>
   </p:cSld>
@@ -9477,6 +10215,133 @@
       </p:sp>
       <p:sp>
         <p:nvSpPr>
+          <p:cNvPr id="3" name="Content Placeholder 2"/>
+          <p:cNvSpPr>
+            <a:spLocks noGrp="1"/>
+          </p:cNvSpPr>
+          <p:nvPr>
+            <p:ph idx="1"/>
+          </p:nvPr>
+        </p:nvSpPr>
+        <p:spPr>
+          <a:xfrm>
+            <a:off x="517586" y="1500996"/>
+            <a:ext cx="10632514" cy="4874403"/>
+          </a:xfrm>
+        </p:spPr>
+        <p:txBody>
+          <a:bodyPr>
+            <a:noAutofit/>
+          </a:bodyPr>
+          <a:lstStyle/>
+          <a:p>
+            <a:pPr algn="just">
+              <a:buFont typeface="Courier New" panose="02070309020205020404" pitchFamily="49" charset="0"/>
+              <a:buChar char="o"/>
+            </a:pPr>
+            <a:r>
+              <a:rPr lang="en-IN" sz="2400" dirty="0">
+                <a:solidFill>
+                  <a:schemeClr val="bg1"/>
+                </a:solidFill>
+                <a:latin typeface="Calibri Light" panose="020F0302020204030204" pitchFamily="34" charset="0"/>
+                <a:cs typeface="Calibri Light" panose="020F0302020204030204" pitchFamily="34" charset="0"/>
+              </a:rPr>
+              <a:t>Music in general is rich in structures. Songs can be viewed as combination of different channels and each channel can be considered as a combination of notes.</a:t>
+            </a:r>
+          </a:p>
+          <a:p>
+            <a:pPr algn="just">
+              <a:buFont typeface="Courier New" panose="02070309020205020404" pitchFamily="49" charset="0"/>
+              <a:buChar char="o"/>
+            </a:pPr>
+            <a:endParaRPr lang="en-IN" sz="2400" dirty="0">
+              <a:solidFill>
+                <a:schemeClr val="bg1"/>
+              </a:solidFill>
+              <a:latin typeface="Calibri Light" panose="020F0302020204030204" pitchFamily="34" charset="0"/>
+              <a:cs typeface="Calibri Light" panose="020F0302020204030204" pitchFamily="34" charset="0"/>
+            </a:endParaRPr>
+          </a:p>
+          <a:p>
+            <a:pPr algn="just">
+              <a:buFont typeface="Courier New" panose="02070309020205020404" pitchFamily="49" charset="0"/>
+              <a:buChar char="o"/>
+            </a:pPr>
+            <a:r>
+              <a:rPr lang="en-IN" sz="2400" dirty="0">
+                <a:solidFill>
+                  <a:schemeClr val="bg1"/>
+                </a:solidFill>
+                <a:latin typeface="Calibri Light" panose="020F0302020204030204" pitchFamily="34" charset="0"/>
+                <a:cs typeface="Calibri Light" panose="020F0302020204030204" pitchFamily="34" charset="0"/>
+              </a:rPr>
+              <a:t>If </a:t>
+            </a:r>
+            <a:r>
+              <a:rPr lang="en-US" sz="2400" dirty="0">
+                <a:solidFill>
+                  <a:schemeClr val="bg1"/>
+                </a:solidFill>
+                <a:latin typeface="Calibri Light" panose="020F0302020204030204" pitchFamily="34" charset="0"/>
+                <a:cs typeface="Calibri Light" panose="020F0302020204030204" pitchFamily="34" charset="0"/>
+              </a:rPr>
+              <a:t>one looks at the sequence of notes that make up a song, one can usually find repeating patterns, for instance, verses will often have exactly the same tune</a:t>
+            </a:r>
+            <a:r>
+              <a:rPr lang="en-IN" sz="2400">
+                <a:solidFill>
+                  <a:schemeClr val="bg1"/>
+                </a:solidFill>
+                <a:latin typeface="Calibri Light" panose="020F0302020204030204" pitchFamily="34" charset="0"/>
+                <a:cs typeface="Calibri Light" panose="020F0302020204030204" pitchFamily="34" charset="0"/>
+              </a:rPr>
+              <a:t>. Observing </a:t>
+            </a:r>
+            <a:r>
+              <a:rPr lang="en-IN" sz="2400" dirty="0">
+                <a:solidFill>
+                  <a:schemeClr val="bg1"/>
+                </a:solidFill>
+                <a:latin typeface="Calibri Light" panose="020F0302020204030204" pitchFamily="34" charset="0"/>
+                <a:cs typeface="Calibri Light" panose="020F0302020204030204" pitchFamily="34" charset="0"/>
+              </a:rPr>
+              <a:t>carefully, it can be observed that certain phrases (or shorter sequence of notes) occur more frequently.</a:t>
+            </a:r>
+          </a:p>
+          <a:p>
+            <a:pPr algn="just">
+              <a:buFont typeface="Courier New" panose="02070309020205020404" pitchFamily="49" charset="0"/>
+              <a:buChar char="o"/>
+            </a:pPr>
+            <a:endParaRPr lang="en-IN" sz="2400" dirty="0">
+              <a:solidFill>
+                <a:schemeClr val="bg1"/>
+              </a:solidFill>
+              <a:latin typeface="Calibri Light" panose="020F0302020204030204" pitchFamily="34" charset="0"/>
+              <a:cs typeface="Calibri Light" panose="020F0302020204030204" pitchFamily="34" charset="0"/>
+            </a:endParaRPr>
+          </a:p>
+          <a:p>
+            <a:pPr algn="just">
+              <a:buFont typeface="Courier New" panose="02070309020205020404" pitchFamily="49" charset="0"/>
+              <a:buChar char="o"/>
+            </a:pPr>
+            <a:r>
+              <a:rPr lang="en-IN" sz="2400" dirty="0">
+                <a:solidFill>
+                  <a:schemeClr val="bg1"/>
+                </a:solidFill>
+                <a:latin typeface="Calibri Light" panose="020F0302020204030204" pitchFamily="34" charset="0"/>
+                <a:cs typeface="Calibri Light" panose="020F0302020204030204" pitchFamily="34" charset="0"/>
+              </a:rPr>
+              <a:t>Notes can be perceived as lying on a circle. Distance between the notes is defined by finding the distances between equivalent nodes (in terms of frequencies).</a:t>
+            </a:r>
+          </a:p>
+        </p:txBody>
+      </p:sp>
+      <p:sp>
+        <p:nvSpPr>
           <p:cNvPr id="11" name="Title 1"/>
           <p:cNvSpPr txBox="1">
             <a:spLocks/>
@@ -9536,132 +10401,10 @@
           </a:p>
         </p:txBody>
       </p:sp>
-      <p:sp>
-        <p:nvSpPr>
-          <p:cNvPr id="2" name="TextBox 1"/>
-          <p:cNvSpPr txBox="1"/>
-          <p:nvPr/>
-        </p:nvSpPr>
-        <p:spPr>
-          <a:xfrm>
-            <a:off x="1716409" y="5903241"/>
-            <a:ext cx="2814065" cy="338554"/>
-          </a:xfrm>
-          <a:prstGeom prst="rect">
-            <a:avLst/>
-          </a:prstGeom>
-          <a:noFill/>
-        </p:spPr>
-        <p:txBody>
-          <a:bodyPr wrap="square" rtlCol="0">
-            <a:spAutoFit/>
-          </a:bodyPr>
-          <a:lstStyle/>
-          <a:p>
-            <a:pPr algn="ctr"/>
-            <a:r>
-              <a:rPr lang="en-IN" sz="1600" dirty="0">
-                <a:solidFill>
-                  <a:schemeClr val="bg1"/>
-                </a:solidFill>
-                <a:latin typeface="Calibri Light" panose="020F0302020204030204" pitchFamily="34" charset="0"/>
-                <a:ea typeface="+mj-ea"/>
-                <a:cs typeface="Calibri Light" panose="020F0302020204030204" pitchFamily="34" charset="0"/>
-              </a:rPr>
-              <a:t>Fig. 1: Circle of Notes*</a:t>
-            </a:r>
-          </a:p>
-        </p:txBody>
-      </p:sp>
-      <p:sp>
-        <p:nvSpPr>
-          <p:cNvPr id="17" name="TextBox 16">
-            <a:extLst>
-              <a:ext uri="{FF2B5EF4-FFF2-40B4-BE49-F238E27FC236}">
-                <a16:creationId xmlns:a16="http://schemas.microsoft.com/office/drawing/2014/main" id="{A3C5F30B-5F1A-4506-912E-986C77344E11}"/>
-              </a:ext>
-            </a:extLst>
-          </p:cNvPr>
-          <p:cNvSpPr txBox="1"/>
-          <p:nvPr/>
-        </p:nvSpPr>
-        <p:spPr>
-          <a:xfrm>
-            <a:off x="8230820" y="6335262"/>
-            <a:ext cx="2919279" cy="253916"/>
-          </a:xfrm>
-          <a:prstGeom prst="rect">
-            <a:avLst/>
-          </a:prstGeom>
-          <a:noFill/>
-        </p:spPr>
-        <p:txBody>
-          <a:bodyPr wrap="square" rtlCol="0">
-            <a:spAutoFit/>
-          </a:bodyPr>
-          <a:lstStyle/>
-          <a:p>
-            <a:r>
-              <a:rPr lang="en-US" sz="1050" dirty="0">
-                <a:solidFill>
-                  <a:schemeClr val="bg1"/>
-                </a:solidFill>
-              </a:rPr>
-              <a:t>*Source: </a:t>
-            </a:r>
-            <a:r>
-              <a:rPr lang="en-US" sz="1050" dirty="0" err="1">
-                <a:solidFill>
-                  <a:schemeClr val="bg1"/>
-                </a:solidFill>
-              </a:rPr>
-              <a:t>Sethares</a:t>
-            </a:r>
-            <a:r>
-              <a:rPr lang="en-US" sz="1050" dirty="0">
-                <a:solidFill>
-                  <a:schemeClr val="bg1"/>
-                </a:solidFill>
-              </a:rPr>
-              <a:t> et al., Topology of Musical Data</a:t>
-            </a:r>
-          </a:p>
-        </p:txBody>
-      </p:sp>
-      <p:pic>
-        <p:nvPicPr>
-          <p:cNvPr id="14" name="Picture 13">
-            <a:extLst>
-              <a:ext uri="{FF2B5EF4-FFF2-40B4-BE49-F238E27FC236}">
-                <a16:creationId xmlns:a16="http://schemas.microsoft.com/office/drawing/2014/main" id="{3301FFCA-D1A4-46D2-AB48-C90EACD1798E}"/>
-              </a:ext>
-            </a:extLst>
-          </p:cNvPr>
-          <p:cNvPicPr>
-            <a:picLocks noChangeAspect="1"/>
-          </p:cNvPicPr>
-          <p:nvPr/>
-        </p:nvPicPr>
-        <p:blipFill>
-          <a:blip r:embed="rId4"/>
-          <a:stretch>
-            <a:fillRect/>
-          </a:stretch>
-        </p:blipFill>
-        <p:spPr>
-          <a:xfrm>
-            <a:off x="639297" y="1454344"/>
-            <a:ext cx="4968291" cy="4388750"/>
-          </a:xfrm>
-          <a:prstGeom prst="rect">
-            <a:avLst/>
-          </a:prstGeom>
-        </p:spPr>
-      </p:pic>
     </p:spTree>
     <p:extLst>
       <p:ext uri="{BB962C8B-B14F-4D97-AF65-F5344CB8AC3E}">
-        <p14:creationId xmlns:p14="http://schemas.microsoft.com/office/powerpoint/2010/main" val="2298110202"/>
+        <p14:creationId xmlns:p14="http://schemas.microsoft.com/office/powerpoint/2010/main" val="3848863018"/>
       </p:ext>
     </p:extLst>
   </p:cSld>
@@ -9990,154 +10733,6 @@
       </p:sp>
       <p:sp>
         <p:nvSpPr>
-          <p:cNvPr id="3" name="Content Placeholder 2"/>
-          <p:cNvSpPr>
-            <a:spLocks noGrp="1"/>
-          </p:cNvSpPr>
-          <p:nvPr>
-            <p:ph idx="1"/>
-          </p:nvPr>
-        </p:nvSpPr>
-        <p:spPr>
-          <a:xfrm>
-            <a:off x="517586" y="1500996"/>
-            <a:ext cx="10632514" cy="4874403"/>
-          </a:xfrm>
-        </p:spPr>
-        <p:txBody>
-          <a:bodyPr>
-            <a:noAutofit/>
-          </a:bodyPr>
-          <a:lstStyle/>
-          <a:p>
-            <a:pPr algn="just">
-              <a:spcAft>
-                <a:spcPts val="2500"/>
-              </a:spcAft>
-              <a:buClr>
-                <a:schemeClr val="accent1">
-                  <a:lumMod val="75000"/>
-                </a:schemeClr>
-              </a:buClr>
-              <a:buSzPct val="75000"/>
-              <a:buFont typeface="Courier New" panose="02070309020205020404" pitchFamily="49" charset="0"/>
-              <a:buChar char="o"/>
-            </a:pPr>
-            <a:r>
-              <a:rPr lang="en-US" sz="2400" dirty="0">
-                <a:solidFill>
-                  <a:schemeClr val="bg1"/>
-                </a:solidFill>
-                <a:latin typeface="Calibri Light" panose="020F0302020204030204" pitchFamily="34" charset="0"/>
-                <a:cs typeface="Calibri Light" panose="020F0302020204030204" pitchFamily="34" charset="0"/>
-              </a:rPr>
-              <a:t>Explore topological structures of data.</a:t>
-            </a:r>
-          </a:p>
-          <a:p>
-            <a:pPr algn="just">
-              <a:spcAft>
-                <a:spcPts val="2500"/>
-              </a:spcAft>
-              <a:buClr>
-                <a:schemeClr val="accent1">
-                  <a:lumMod val="75000"/>
-                </a:schemeClr>
-              </a:buClr>
-              <a:buSzPct val="75000"/>
-              <a:buFont typeface="Courier New" panose="02070309020205020404" pitchFamily="49" charset="0"/>
-              <a:buChar char="o"/>
-            </a:pPr>
-            <a:r>
-              <a:rPr lang="en-US" sz="2400" dirty="0">
-                <a:solidFill>
-                  <a:schemeClr val="bg1"/>
-                </a:solidFill>
-                <a:latin typeface="Calibri Light" panose="020F0302020204030204" pitchFamily="34" charset="0"/>
-                <a:cs typeface="Calibri Light" panose="020F0302020204030204" pitchFamily="34" charset="0"/>
-              </a:rPr>
-              <a:t>Identification of 4-chord progression</a:t>
-            </a:r>
-          </a:p>
-          <a:p>
-            <a:pPr algn="just">
-              <a:spcAft>
-                <a:spcPts val="2500"/>
-              </a:spcAft>
-              <a:buClr>
-                <a:schemeClr val="accent1">
-                  <a:lumMod val="75000"/>
-                </a:schemeClr>
-              </a:buClr>
-              <a:buSzPct val="75000"/>
-              <a:buFont typeface="Courier New" panose="02070309020205020404" pitchFamily="49" charset="0"/>
-              <a:buChar char="o"/>
-            </a:pPr>
-            <a:r>
-              <a:rPr lang="en-US" sz="2400" dirty="0">
-                <a:solidFill>
-                  <a:schemeClr val="bg1"/>
-                </a:solidFill>
-                <a:latin typeface="Calibri Light" panose="020F0302020204030204" pitchFamily="34" charset="0"/>
-                <a:cs typeface="Calibri Light" panose="020F0302020204030204" pitchFamily="34" charset="0"/>
-              </a:rPr>
-              <a:t>Genre Classification</a:t>
-            </a:r>
-          </a:p>
-          <a:p>
-            <a:pPr algn="just">
-              <a:spcAft>
-                <a:spcPts val="2500"/>
-              </a:spcAft>
-              <a:buClr>
-                <a:schemeClr val="accent1">
-                  <a:lumMod val="75000"/>
-                </a:schemeClr>
-              </a:buClr>
-              <a:buSzPct val="75000"/>
-              <a:buFont typeface="Courier New" panose="02070309020205020404" pitchFamily="49" charset="0"/>
-              <a:buChar char="o"/>
-            </a:pPr>
-            <a:r>
-              <a:rPr lang="en-US" sz="2400" dirty="0">
-                <a:solidFill>
-                  <a:schemeClr val="bg1"/>
-                </a:solidFill>
-                <a:latin typeface="Calibri Light" panose="020F0302020204030204" pitchFamily="34" charset="0"/>
-                <a:cs typeface="Calibri Light" panose="020F0302020204030204" pitchFamily="34" charset="0"/>
-              </a:rPr>
-              <a:t>Artist Identification</a:t>
-            </a:r>
-          </a:p>
-          <a:p>
-            <a:pPr algn="just">
-              <a:spcAft>
-                <a:spcPts val="2500"/>
-              </a:spcAft>
-              <a:buClr>
-                <a:schemeClr val="accent1">
-                  <a:lumMod val="75000"/>
-                </a:schemeClr>
-              </a:buClr>
-              <a:buSzPct val="75000"/>
-              <a:buFont typeface="Courier New" panose="02070309020205020404" pitchFamily="49" charset="0"/>
-              <a:buChar char="o"/>
-            </a:pPr>
-            <a:r>
-              <a:rPr lang="en-US" sz="2400" dirty="0">
-                <a:solidFill>
-                  <a:schemeClr val="bg1"/>
-                </a:solidFill>
-                <a:latin typeface="Calibri Light" panose="020F0302020204030204" pitchFamily="34" charset="0"/>
-                <a:cs typeface="Calibri Light" panose="020F0302020204030204" pitchFamily="34" charset="0"/>
-              </a:rPr>
-              <a:t>Comparison of Musical Styles. Ex. Classical vs Pop.</a:t>
-            </a:r>
-          </a:p>
-        </p:txBody>
-      </p:sp>
-      <p:sp>
-        <p:nvSpPr>
           <p:cNvPr id="11" name="Title 1"/>
           <p:cNvSpPr txBox="1">
             <a:spLocks/>
@@ -10192,15 +10787,137 @@
                 <a:ea typeface="+mj-ea"/>
                 <a:cs typeface="+mj-cs"/>
               </a:rPr>
-              <a:t>Proposed Tasks</a:t>
-            </a:r>
-          </a:p>
-        </p:txBody>
-      </p:sp>
+              <a:t>Background and Motivation</a:t>
+            </a:r>
+          </a:p>
+        </p:txBody>
+      </p:sp>
+      <p:sp>
+        <p:nvSpPr>
+          <p:cNvPr id="2" name="TextBox 1"/>
+          <p:cNvSpPr txBox="1"/>
+          <p:nvPr/>
+        </p:nvSpPr>
+        <p:spPr>
+          <a:xfrm>
+            <a:off x="1716409" y="5903241"/>
+            <a:ext cx="2814065" cy="338554"/>
+          </a:xfrm>
+          <a:prstGeom prst="rect">
+            <a:avLst/>
+          </a:prstGeom>
+          <a:noFill/>
+        </p:spPr>
+        <p:txBody>
+          <a:bodyPr wrap="square" rtlCol="0">
+            <a:spAutoFit/>
+          </a:bodyPr>
+          <a:lstStyle/>
+          <a:p>
+            <a:pPr algn="ctr"/>
+            <a:r>
+              <a:rPr lang="en-IN" sz="1600" dirty="0">
+                <a:solidFill>
+                  <a:schemeClr val="bg1"/>
+                </a:solidFill>
+                <a:latin typeface="Calibri Light" panose="020F0302020204030204" pitchFamily="34" charset="0"/>
+                <a:ea typeface="+mj-ea"/>
+                <a:cs typeface="Calibri Light" panose="020F0302020204030204" pitchFamily="34" charset="0"/>
+              </a:rPr>
+              <a:t>Fig. 1: Circle of Notes*</a:t>
+            </a:r>
+          </a:p>
+        </p:txBody>
+      </p:sp>
+      <p:sp>
+        <p:nvSpPr>
+          <p:cNvPr id="17" name="TextBox 16">
+            <a:extLst>
+              <a:ext uri="{FF2B5EF4-FFF2-40B4-BE49-F238E27FC236}">
+                <a16:creationId xmlns:a16="http://schemas.microsoft.com/office/drawing/2014/main" id="{A3C5F30B-5F1A-4506-912E-986C77344E11}"/>
+              </a:ext>
+            </a:extLst>
+          </p:cNvPr>
+          <p:cNvSpPr txBox="1"/>
+          <p:nvPr/>
+        </p:nvSpPr>
+        <p:spPr>
+          <a:xfrm>
+            <a:off x="8230820" y="6335262"/>
+            <a:ext cx="2919279" cy="253916"/>
+          </a:xfrm>
+          <a:prstGeom prst="rect">
+            <a:avLst/>
+          </a:prstGeom>
+          <a:noFill/>
+        </p:spPr>
+        <p:txBody>
+          <a:bodyPr wrap="square" rtlCol="0">
+            <a:spAutoFit/>
+          </a:bodyPr>
+          <a:lstStyle/>
+          <a:p>
+            <a:r>
+              <a:rPr lang="en-US" sz="1050" dirty="0">
+                <a:solidFill>
+                  <a:schemeClr val="bg1"/>
+                </a:solidFill>
+              </a:rPr>
+              <a:t>*Source: </a:t>
+            </a:r>
+            <a:r>
+              <a:rPr lang="en-US" sz="1050" dirty="0" err="1">
+                <a:solidFill>
+                  <a:schemeClr val="bg1"/>
+                </a:solidFill>
+              </a:rPr>
+              <a:t>Sethares</a:t>
+            </a:r>
+            <a:r>
+              <a:rPr lang="en-US" sz="1050" dirty="0">
+                <a:solidFill>
+                  <a:schemeClr val="bg1"/>
+                </a:solidFill>
+              </a:rPr>
+              <a:t> et al., Topology of Musical Data</a:t>
+            </a:r>
+          </a:p>
+        </p:txBody>
+      </p:sp>
+      <p:pic>
+        <p:nvPicPr>
+          <p:cNvPr id="14" name="Picture 13">
+            <a:extLst>
+              <a:ext uri="{FF2B5EF4-FFF2-40B4-BE49-F238E27FC236}">
+                <a16:creationId xmlns:a16="http://schemas.microsoft.com/office/drawing/2014/main" id="{3301FFCA-D1A4-46D2-AB48-C90EACD1798E}"/>
+              </a:ext>
+            </a:extLst>
+          </p:cNvPr>
+          <p:cNvPicPr>
+            <a:picLocks noChangeAspect="1"/>
+          </p:cNvPicPr>
+          <p:nvPr/>
+        </p:nvPicPr>
+        <p:blipFill>
+          <a:blip r:embed="rId4"/>
+          <a:stretch>
+            <a:fillRect/>
+          </a:stretch>
+        </p:blipFill>
+        <p:spPr>
+          <a:xfrm>
+            <a:off x="639297" y="1454344"/>
+            <a:ext cx="4968291" cy="4388750"/>
+          </a:xfrm>
+          <a:prstGeom prst="rect">
+            <a:avLst/>
+          </a:prstGeom>
+        </p:spPr>
+      </p:pic>
     </p:spTree>
     <p:extLst>
       <p:ext uri="{BB962C8B-B14F-4D97-AF65-F5344CB8AC3E}">
-        <p14:creationId xmlns:p14="http://schemas.microsoft.com/office/powerpoint/2010/main" val="1489121590"/>
+        <p14:creationId xmlns:p14="http://schemas.microsoft.com/office/powerpoint/2010/main" val="2298110202"/>
       </p:ext>
     </p:extLst>
   </p:cSld>
@@ -10570,7 +11287,7 @@
                 <a:latin typeface="Calibri Light" panose="020F0302020204030204" pitchFamily="34" charset="0"/>
                 <a:cs typeface="Calibri Light" panose="020F0302020204030204" pitchFamily="34" charset="0"/>
               </a:rPr>
-              <a:t>Significant progress in Data collection pipeline. It includes downloading the required midi version of a song and extracting appropriate channels from it.</a:t>
+              <a:t>Explore topological structures of data</a:t>
             </a:r>
           </a:p>
           <a:p>
@@ -10595,7 +11312,7 @@
                 <a:latin typeface="Calibri Light" panose="020F0302020204030204" pitchFamily="34" charset="0"/>
                 <a:cs typeface="Calibri Light" panose="020F0302020204030204" pitchFamily="34" charset="0"/>
               </a:rPr>
-              <a:t>Point cloud extraction: Single-note embedding (extract a set of all the notes in the song) and time-series embedding (extract a set of all note sequences of length N).</a:t>
+              <a:t>Genre Classification</a:t>
             </a:r>
           </a:p>
           <a:p>
@@ -10620,27 +11337,7 @@
                 <a:latin typeface="Calibri Light" panose="020F0302020204030204" pitchFamily="34" charset="0"/>
                 <a:cs typeface="Calibri Light" panose="020F0302020204030204" pitchFamily="34" charset="0"/>
               </a:rPr>
-              <a:t>Compute the distance matrix for the specific class of point-cloud being used, as input to </a:t>
-            </a:r>
-            <a:r>
-              <a:rPr lang="en-US" sz="2400" dirty="0" err="1">
-                <a:solidFill>
-                  <a:schemeClr val="bg1"/>
-                </a:solidFill>
-                <a:latin typeface="Calibri Light" panose="020F0302020204030204" pitchFamily="34" charset="0"/>
-                <a:cs typeface="Calibri Light" panose="020F0302020204030204" pitchFamily="34" charset="0"/>
-              </a:rPr>
-              <a:t>ripser</a:t>
-            </a:r>
-            <a:r>
-              <a:rPr lang="en-US" sz="2400" dirty="0">
-                <a:solidFill>
-                  <a:schemeClr val="bg1"/>
-                </a:solidFill>
-                <a:latin typeface="Calibri Light" panose="020F0302020204030204" pitchFamily="34" charset="0"/>
-                <a:cs typeface="Calibri Light" panose="020F0302020204030204" pitchFamily="34" charset="0"/>
-              </a:rPr>
-              <a:t> for computation of persistence diagrams/barcodes.</a:t>
+              <a:t>Artist Identification</a:t>
             </a:r>
           </a:p>
           <a:p>
@@ -10665,7 +11362,32 @@
                 <a:latin typeface="Calibri Light" panose="020F0302020204030204" pitchFamily="34" charset="0"/>
                 <a:cs typeface="Calibri Light" panose="020F0302020204030204" pitchFamily="34" charset="0"/>
               </a:rPr>
-              <a:t>Apply Bottleneck and Wasserstein distance measures to compute the distance similarity between the persistence diagrams and plotting them using TSNE.</a:t>
+              <a:t>Comparison of Musical Styles. Ex. Classical vs Pop</a:t>
+            </a:r>
+          </a:p>
+          <a:p>
+            <a:pPr algn="just">
+              <a:spcAft>
+                <a:spcPts val="2500"/>
+              </a:spcAft>
+              <a:buClr>
+                <a:schemeClr val="accent1">
+                  <a:lumMod val="75000"/>
+                </a:schemeClr>
+              </a:buClr>
+              <a:buSzPct val="75000"/>
+              <a:buFont typeface="Courier New" panose="02070309020205020404" pitchFamily="49" charset="0"/>
+              <a:buChar char="o"/>
+            </a:pPr>
+            <a:r>
+              <a:rPr lang="en-US" sz="2400" dirty="0">
+                <a:solidFill>
+                  <a:schemeClr val="bg1"/>
+                </a:solidFill>
+                <a:latin typeface="Calibri Light" panose="020F0302020204030204" pitchFamily="34" charset="0"/>
+                <a:cs typeface="Calibri Light" panose="020F0302020204030204" pitchFamily="34" charset="0"/>
+              </a:rPr>
+              <a:t>Identification of 4-chord progression</a:t>
             </a:r>
           </a:p>
         </p:txBody>
@@ -10726,7 +11448,7 @@
                 <a:ea typeface="+mj-ea"/>
                 <a:cs typeface="+mj-cs"/>
               </a:rPr>
-              <a:t>Work done so far..</a:t>
+              <a:t>Proposed Tasks</a:t>
             </a:r>
           </a:p>
         </p:txBody>
@@ -10734,7 +11456,7 @@
     </p:spTree>
     <p:extLst>
       <p:ext uri="{BB962C8B-B14F-4D97-AF65-F5344CB8AC3E}">
-        <p14:creationId xmlns:p14="http://schemas.microsoft.com/office/powerpoint/2010/main" val="3606406715"/>
+        <p14:creationId xmlns:p14="http://schemas.microsoft.com/office/powerpoint/2010/main" val="1489121590"/>
       </p:ext>
     </p:extLst>
   </p:cSld>
@@ -11063,6 +11785,149 @@
       </p:sp>
       <p:sp>
         <p:nvSpPr>
+          <p:cNvPr id="3" name="Content Placeholder 2"/>
+          <p:cNvSpPr>
+            <a:spLocks noGrp="1"/>
+          </p:cNvSpPr>
+          <p:nvPr>
+            <p:ph idx="1"/>
+          </p:nvPr>
+        </p:nvSpPr>
+        <p:spPr>
+          <a:xfrm>
+            <a:off x="517586" y="1500996"/>
+            <a:ext cx="10632514" cy="4874403"/>
+          </a:xfrm>
+        </p:spPr>
+        <p:txBody>
+          <a:bodyPr>
+            <a:noAutofit/>
+          </a:bodyPr>
+          <a:lstStyle/>
+          <a:p>
+            <a:pPr algn="just">
+              <a:spcAft>
+                <a:spcPts val="2500"/>
+              </a:spcAft>
+              <a:buClr>
+                <a:schemeClr val="accent1">
+                  <a:lumMod val="75000"/>
+                </a:schemeClr>
+              </a:buClr>
+              <a:buSzPct val="75000"/>
+              <a:buFont typeface="Courier New" panose="02070309020205020404" pitchFamily="49" charset="0"/>
+              <a:buChar char="o"/>
+            </a:pPr>
+            <a:r>
+              <a:rPr lang="en-US" sz="2400" dirty="0">
+                <a:solidFill>
+                  <a:schemeClr val="bg1"/>
+                </a:solidFill>
+                <a:latin typeface="Calibri Light" panose="020F0302020204030204" pitchFamily="34" charset="0"/>
+                <a:cs typeface="Calibri Light" panose="020F0302020204030204" pitchFamily="34" charset="0"/>
+              </a:rPr>
+              <a:t>Significant progress in data collection pipeline. It includes downloading the required midi version of a song and extracting appropriate channels from it.</a:t>
+            </a:r>
+          </a:p>
+          <a:p>
+            <a:pPr algn="just">
+              <a:spcAft>
+                <a:spcPts val="2500"/>
+              </a:spcAft>
+              <a:buClr>
+                <a:schemeClr val="accent1">
+                  <a:lumMod val="75000"/>
+                </a:schemeClr>
+              </a:buClr>
+              <a:buSzPct val="75000"/>
+              <a:buFont typeface="Courier New" panose="02070309020205020404" pitchFamily="49" charset="0"/>
+              <a:buChar char="o"/>
+            </a:pPr>
+            <a:r>
+              <a:rPr lang="en-US" sz="2400" dirty="0">
+                <a:solidFill>
+                  <a:schemeClr val="bg1"/>
+                </a:solidFill>
+                <a:latin typeface="Calibri Light" panose="020F0302020204030204" pitchFamily="34" charset="0"/>
+                <a:cs typeface="Calibri Light" panose="020F0302020204030204" pitchFamily="34" charset="0"/>
+              </a:rPr>
+              <a:t>Point cloud extraction: Single-note embedding (extract a set of all the notes in the song) and Time-series embedding (extract a set of all note sequences of length N).</a:t>
+            </a:r>
+          </a:p>
+          <a:p>
+            <a:pPr algn="just">
+              <a:spcAft>
+                <a:spcPts val="2500"/>
+              </a:spcAft>
+              <a:buClr>
+                <a:schemeClr val="accent1">
+                  <a:lumMod val="75000"/>
+                </a:schemeClr>
+              </a:buClr>
+              <a:buSzPct val="75000"/>
+              <a:buFont typeface="Courier New" panose="02070309020205020404" pitchFamily="49" charset="0"/>
+              <a:buChar char="o"/>
+            </a:pPr>
+            <a:r>
+              <a:rPr lang="en-US" sz="2400" dirty="0">
+                <a:solidFill>
+                  <a:schemeClr val="bg1"/>
+                </a:solidFill>
+                <a:latin typeface="Calibri Light" panose="020F0302020204030204" pitchFamily="34" charset="0"/>
+                <a:cs typeface="Calibri Light" panose="020F0302020204030204" pitchFamily="34" charset="0"/>
+              </a:rPr>
+              <a:t>Compute the distance matrix for the specific class of point-cloud being used, as input to </a:t>
+            </a:r>
+            <a:r>
+              <a:rPr lang="en-US" sz="2400" dirty="0" err="1">
+                <a:solidFill>
+                  <a:schemeClr val="bg1"/>
+                </a:solidFill>
+                <a:latin typeface="Calibri Light" panose="020F0302020204030204" pitchFamily="34" charset="0"/>
+                <a:cs typeface="Calibri Light" panose="020F0302020204030204" pitchFamily="34" charset="0"/>
+              </a:rPr>
+              <a:t>ripser</a:t>
+            </a:r>
+            <a:r>
+              <a:rPr lang="en-US" sz="2400" dirty="0">
+                <a:solidFill>
+                  <a:schemeClr val="bg1"/>
+                </a:solidFill>
+                <a:latin typeface="Calibri Light" panose="020F0302020204030204" pitchFamily="34" charset="0"/>
+                <a:cs typeface="Calibri Light" panose="020F0302020204030204" pitchFamily="34" charset="0"/>
+              </a:rPr>
+              <a:t> for computation of persistence diagrams/barcodes.</a:t>
+            </a:r>
+          </a:p>
+          <a:p>
+            <a:pPr algn="just">
+              <a:spcAft>
+                <a:spcPts val="2500"/>
+              </a:spcAft>
+              <a:buClr>
+                <a:schemeClr val="accent1">
+                  <a:lumMod val="75000"/>
+                </a:schemeClr>
+              </a:buClr>
+              <a:buSzPct val="75000"/>
+              <a:buFont typeface="Courier New" panose="02070309020205020404" pitchFamily="49" charset="0"/>
+              <a:buChar char="o"/>
+            </a:pPr>
+            <a:r>
+              <a:rPr lang="en-US" sz="2400" dirty="0">
+                <a:solidFill>
+                  <a:schemeClr val="bg1"/>
+                </a:solidFill>
+                <a:latin typeface="Calibri Light" panose="020F0302020204030204" pitchFamily="34" charset="0"/>
+                <a:cs typeface="Calibri Light" panose="020F0302020204030204" pitchFamily="34" charset="0"/>
+              </a:rPr>
+              <a:t>Apply Bottleneck and Wasserstein distance measures to compute the dissimilarity between the persistence diagrams and plotting them using TSNE.</a:t>
+            </a:r>
+          </a:p>
+        </p:txBody>
+      </p:sp>
+      <p:sp>
+        <p:nvSpPr>
           <p:cNvPr id="11" name="Title 1"/>
           <p:cNvSpPr txBox="1">
             <a:spLocks/>
@@ -11117,44 +11982,15 @@
                 <a:ea typeface="+mj-ea"/>
                 <a:cs typeface="+mj-cs"/>
               </a:rPr>
-              <a:t>Procedure: Data Collection Pipeline</a:t>
-            </a:r>
-          </a:p>
-        </p:txBody>
-      </p:sp>
-      <p:pic>
-        <p:nvPicPr>
-          <p:cNvPr id="14" name="Content Placeholder 13">
-            <a:extLst>
-              <a:ext uri="{FF2B5EF4-FFF2-40B4-BE49-F238E27FC236}">
-                <a16:creationId xmlns:a16="http://schemas.microsoft.com/office/drawing/2014/main" id="{7D514EBD-149A-45F9-B2AE-B079CF539CB1}"/>
-              </a:ext>
-            </a:extLst>
-          </p:cNvPr>
-          <p:cNvPicPr>
-            <a:picLocks noGrp="1" noChangeAspect="1"/>
-          </p:cNvPicPr>
-          <p:nvPr>
-            <p:ph idx="1"/>
-          </p:nvPr>
-        </p:nvPicPr>
-        <p:blipFill>
-          <a:blip r:embed="rId4"/>
-          <a:stretch>
-            <a:fillRect/>
-          </a:stretch>
-        </p:blipFill>
-        <p:spPr>
-          <a:xfrm>
-            <a:off x="808344" y="1603271"/>
-            <a:ext cx="10322459" cy="4207593"/>
-          </a:xfrm>
-        </p:spPr>
-      </p:pic>
+              <a:t>Work done so far..</a:t>
+            </a:r>
+          </a:p>
+        </p:txBody>
+      </p:sp>
     </p:spTree>
     <p:extLst>
       <p:ext uri="{BB962C8B-B14F-4D97-AF65-F5344CB8AC3E}">
-        <p14:creationId xmlns:p14="http://schemas.microsoft.com/office/powerpoint/2010/main" val="2548636186"/>
+        <p14:creationId xmlns:p14="http://schemas.microsoft.com/office/powerpoint/2010/main" val="3606406715"/>
       </p:ext>
     </p:extLst>
   </p:cSld>
@@ -11537,24 +12373,26 @@
                 <a:ea typeface="+mj-ea"/>
                 <a:cs typeface="+mj-cs"/>
               </a:rPr>
-              <a:t>Results: Persistence Diagram Distances</a:t>
+              <a:t>Procedure: Data Collection Pipeline</a:t>
             </a:r>
           </a:p>
         </p:txBody>
       </p:sp>
       <p:pic>
         <p:nvPicPr>
-          <p:cNvPr id="13" name="Picture 12">
+          <p:cNvPr id="14" name="Content Placeholder 13">
             <a:extLst>
               <a:ext uri="{FF2B5EF4-FFF2-40B4-BE49-F238E27FC236}">
-                <a16:creationId xmlns:a16="http://schemas.microsoft.com/office/drawing/2014/main" id="{7CCCF3D8-8037-4BFD-B8D4-F8D686D8A4D9}"/>
+                <a16:creationId xmlns:a16="http://schemas.microsoft.com/office/drawing/2014/main" id="{7D514EBD-149A-45F9-B2AE-B079CF539CB1}"/>
               </a:ext>
             </a:extLst>
           </p:cNvPr>
           <p:cNvPicPr>
-            <a:picLocks noChangeAspect="1"/>
+            <a:picLocks noGrp="1" noChangeAspect="1"/>
           </p:cNvPicPr>
-          <p:nvPr/>
+          <p:nvPr>
+            <p:ph idx="1"/>
+          </p:nvPr>
         </p:nvPicPr>
         <p:blipFill>
           <a:blip r:embed="rId4"/>
@@ -11564,18 +12402,15 @@
         </p:blipFill>
         <p:spPr>
           <a:xfrm>
-            <a:off x="639297" y="1270000"/>
-            <a:ext cx="7025173" cy="5173799"/>
+            <a:off x="808344" y="1603271"/>
+            <a:ext cx="10322459" cy="4207593"/>
           </a:xfrm>
-          <a:prstGeom prst="rect">
-            <a:avLst/>
-          </a:prstGeom>
         </p:spPr>
       </p:pic>
     </p:spTree>
     <p:extLst>
       <p:ext uri="{BB962C8B-B14F-4D97-AF65-F5344CB8AC3E}">
-        <p14:creationId xmlns:p14="http://schemas.microsoft.com/office/powerpoint/2010/main" val="2553564423"/>
+        <p14:creationId xmlns:p14="http://schemas.microsoft.com/office/powerpoint/2010/main" val="2548636186"/>
       </p:ext>
     </p:extLst>
   </p:cSld>
@@ -11965,10 +12800,10 @@
       </p:sp>
       <p:pic>
         <p:nvPicPr>
-          <p:cNvPr id="2" name="Picture 1">
+          <p:cNvPr id="13" name="Picture 12">
             <a:extLst>
               <a:ext uri="{FF2B5EF4-FFF2-40B4-BE49-F238E27FC236}">
-                <a16:creationId xmlns:a16="http://schemas.microsoft.com/office/drawing/2014/main" id="{9786DA3F-D6E1-4B1A-BE56-C5EF47FE491C}"/>
+                <a16:creationId xmlns:a16="http://schemas.microsoft.com/office/drawing/2014/main" id="{7CCCF3D8-8037-4BFD-B8D4-F8D686D8A4D9}"/>
               </a:ext>
             </a:extLst>
           </p:cNvPr>
@@ -11985,8 +12820,8 @@
         </p:blipFill>
         <p:spPr>
           <a:xfrm>
-            <a:off x="745174" y="1381284"/>
-            <a:ext cx="6683924" cy="4886326"/>
+            <a:off x="639297" y="1270000"/>
+            <a:ext cx="7025173" cy="5173799"/>
           </a:xfrm>
           <a:prstGeom prst="rect">
             <a:avLst/>
@@ -11996,7 +12831,7 @@
     </p:spTree>
     <p:extLst>
       <p:ext uri="{BB962C8B-B14F-4D97-AF65-F5344CB8AC3E}">
-        <p14:creationId xmlns:p14="http://schemas.microsoft.com/office/powerpoint/2010/main" val="2042230145"/>
+        <p14:creationId xmlns:p14="http://schemas.microsoft.com/office/powerpoint/2010/main" val="2553564423"/>
       </p:ext>
     </p:extLst>
   </p:cSld>
@@ -12325,220 +13160,6 @@
       </p:sp>
       <p:sp>
         <p:nvSpPr>
-          <p:cNvPr id="3" name="Content Placeholder 2"/>
-          <p:cNvSpPr>
-            <a:spLocks noGrp="1"/>
-          </p:cNvSpPr>
-          <p:nvPr>
-            <p:ph idx="1"/>
-          </p:nvPr>
-        </p:nvSpPr>
-        <p:spPr>
-          <a:xfrm>
-            <a:off x="517586" y="1500996"/>
-            <a:ext cx="10632514" cy="4874403"/>
-          </a:xfrm>
-        </p:spPr>
-        <p:txBody>
-          <a:bodyPr>
-            <a:noAutofit/>
-          </a:bodyPr>
-          <a:lstStyle/>
-          <a:p>
-            <a:pPr algn="just">
-              <a:spcAft>
-                <a:spcPts val="2500"/>
-              </a:spcAft>
-              <a:buClr>
-                <a:schemeClr val="accent1">
-                  <a:lumMod val="75000"/>
-                </a:schemeClr>
-              </a:buClr>
-              <a:buSzPct val="75000"/>
-              <a:buFont typeface="Courier New" panose="02070309020205020404" pitchFamily="49" charset="0"/>
-              <a:buChar char="o"/>
-            </a:pPr>
-            <a:r>
-              <a:rPr lang="en-US" sz="2400" dirty="0">
-                <a:solidFill>
-                  <a:schemeClr val="bg1"/>
-                </a:solidFill>
-                <a:latin typeface="Calibri Light" panose="020F0302020204030204" pitchFamily="34" charset="0"/>
-                <a:cs typeface="Calibri Light" panose="020F0302020204030204" pitchFamily="34" charset="0"/>
-              </a:rPr>
-              <a:t>Finish data collection pipeline.</a:t>
-            </a:r>
-          </a:p>
-          <a:p>
-            <a:pPr algn="just">
-              <a:spcAft>
-                <a:spcPts val="2500"/>
-              </a:spcAft>
-              <a:buClr>
-                <a:schemeClr val="accent1">
-                  <a:lumMod val="75000"/>
-                </a:schemeClr>
-              </a:buClr>
-              <a:buSzPct val="75000"/>
-              <a:buFont typeface="Courier New" panose="02070309020205020404" pitchFamily="49" charset="0"/>
-              <a:buChar char="o"/>
-            </a:pPr>
-            <a:r>
-              <a:rPr lang="en-US" sz="2400" dirty="0">
-                <a:solidFill>
-                  <a:schemeClr val="bg1"/>
-                </a:solidFill>
-                <a:latin typeface="Calibri Light" panose="020F0302020204030204" pitchFamily="34" charset="0"/>
-                <a:cs typeface="Calibri Light" panose="020F0302020204030204" pitchFamily="34" charset="0"/>
-              </a:rPr>
-              <a:t>Implement chord-class (i.e. extract the set of all chords in the track) and chord-sequence embedding (i.e. extract the set of all sequences of chords of length N). </a:t>
-            </a:r>
-          </a:p>
-          <a:p>
-            <a:pPr algn="just">
-              <a:spcAft>
-                <a:spcPts val="2500"/>
-              </a:spcAft>
-              <a:buClr>
-                <a:schemeClr val="accent1">
-                  <a:lumMod val="75000"/>
-                </a:schemeClr>
-              </a:buClr>
-              <a:buSzPct val="75000"/>
-              <a:buFont typeface="Courier New" panose="02070309020205020404" pitchFamily="49" charset="0"/>
-              <a:buChar char="o"/>
-            </a:pPr>
-            <a:r>
-              <a:rPr lang="en-US" sz="2400" dirty="0">
-                <a:solidFill>
-                  <a:schemeClr val="bg1"/>
-                </a:solidFill>
-                <a:latin typeface="Calibri Light" panose="020F0302020204030204" pitchFamily="34" charset="0"/>
-                <a:cs typeface="Calibri Light" panose="020F0302020204030204" pitchFamily="34" charset="0"/>
-              </a:rPr>
-              <a:t>Formulating the distance measure for the above two embeddings. </a:t>
-            </a:r>
-          </a:p>
-          <a:p>
-            <a:pPr algn="just">
-              <a:spcAft>
-                <a:spcPts val="2500"/>
-              </a:spcAft>
-              <a:buClr>
-                <a:schemeClr val="accent1">
-                  <a:lumMod val="75000"/>
-                </a:schemeClr>
-              </a:buClr>
-              <a:buSzPct val="75000"/>
-              <a:buFont typeface="Courier New" panose="02070309020205020404" pitchFamily="49" charset="0"/>
-              <a:buChar char="o"/>
-            </a:pPr>
-            <a:r>
-              <a:rPr lang="en-US" sz="2400" dirty="0">
-                <a:solidFill>
-                  <a:schemeClr val="bg1"/>
-                </a:solidFill>
-                <a:latin typeface="Calibri Light" panose="020F0302020204030204" pitchFamily="34" charset="0"/>
-                <a:cs typeface="Calibri Light" panose="020F0302020204030204" pitchFamily="34" charset="0"/>
-              </a:rPr>
-              <a:t>Use machine learning algorithms along with neural networks for the artist and genre classification based on the songs.</a:t>
-            </a:r>
-          </a:p>
-          <a:p>
-            <a:pPr algn="just">
-              <a:spcAft>
-                <a:spcPts val="2500"/>
-              </a:spcAft>
-              <a:buClr>
-                <a:schemeClr val="accent1">
-                  <a:lumMod val="75000"/>
-                </a:schemeClr>
-              </a:buClr>
-              <a:buSzPct val="75000"/>
-              <a:buFont typeface="Courier New" panose="02070309020205020404" pitchFamily="49" charset="0"/>
-              <a:buChar char="o"/>
-            </a:pPr>
-            <a:r>
-              <a:rPr lang="en-US" sz="2400" dirty="0">
-                <a:solidFill>
-                  <a:schemeClr val="bg1"/>
-                </a:solidFill>
-                <a:latin typeface="Calibri Light" panose="020F0302020204030204" pitchFamily="34" charset="0"/>
-                <a:cs typeface="Calibri Light" panose="020F0302020204030204" pitchFamily="34" charset="0"/>
-              </a:rPr>
-              <a:t>Identifying the common chord progressions in popular music</a:t>
-            </a:r>
-          </a:p>
-          <a:p>
-            <a:pPr algn="just">
-              <a:spcAft>
-                <a:spcPts val="2500"/>
-              </a:spcAft>
-              <a:buClr>
-                <a:schemeClr val="accent1">
-                  <a:lumMod val="75000"/>
-                </a:schemeClr>
-              </a:buClr>
-              <a:buSzPct val="75000"/>
-              <a:buFont typeface="Courier New" panose="02070309020205020404" pitchFamily="49" charset="0"/>
-              <a:buChar char="o"/>
-            </a:pPr>
-            <a:endParaRPr lang="en-US" sz="2400" dirty="0">
-              <a:solidFill>
-                <a:schemeClr val="bg1"/>
-              </a:solidFill>
-              <a:latin typeface="Calibri Light" panose="020F0302020204030204" pitchFamily="34" charset="0"/>
-              <a:cs typeface="Calibri Light" panose="020F0302020204030204" pitchFamily="34" charset="0"/>
-            </a:endParaRPr>
-          </a:p>
-          <a:p>
-            <a:pPr algn="just">
-              <a:spcAft>
-                <a:spcPts val="2500"/>
-              </a:spcAft>
-              <a:buClr>
-                <a:schemeClr val="accent1">
-                  <a:lumMod val="75000"/>
-                </a:schemeClr>
-              </a:buClr>
-              <a:buSzPct val="75000"/>
-              <a:buFont typeface="Courier New" panose="02070309020205020404" pitchFamily="49" charset="0"/>
-              <a:buChar char="o"/>
-            </a:pPr>
-            <a:endParaRPr lang="en-US" sz="2400" dirty="0">
-              <a:solidFill>
-                <a:schemeClr val="bg1"/>
-              </a:solidFill>
-              <a:latin typeface="Calibri Light" panose="020F0302020204030204" pitchFamily="34" charset="0"/>
-              <a:cs typeface="Calibri Light" panose="020F0302020204030204" pitchFamily="34" charset="0"/>
-            </a:endParaRPr>
-          </a:p>
-          <a:p>
-            <a:pPr algn="just">
-              <a:spcAft>
-                <a:spcPts val="2500"/>
-              </a:spcAft>
-              <a:buClr>
-                <a:schemeClr val="accent1">
-                  <a:lumMod val="75000"/>
-                </a:schemeClr>
-              </a:buClr>
-              <a:buSzPct val="75000"/>
-              <a:buFont typeface="Courier New" panose="02070309020205020404" pitchFamily="49" charset="0"/>
-              <a:buChar char="o"/>
-            </a:pPr>
-            <a:endParaRPr lang="en-US" sz="2400" dirty="0">
-              <a:solidFill>
-                <a:schemeClr val="bg1"/>
-              </a:solidFill>
-              <a:latin typeface="Calibri Light" panose="020F0302020204030204" pitchFamily="34" charset="0"/>
-              <a:cs typeface="Calibri Light" panose="020F0302020204030204" pitchFamily="34" charset="0"/>
-            </a:endParaRPr>
-          </a:p>
-        </p:txBody>
-      </p:sp>
-      <p:sp>
-        <p:nvSpPr>
           <p:cNvPr id="11" name="Title 1"/>
           <p:cNvSpPr txBox="1">
             <a:spLocks/>
@@ -12593,15 +13214,45 @@
                 <a:ea typeface="+mj-ea"/>
                 <a:cs typeface="+mj-cs"/>
               </a:rPr>
-              <a:t>Upcoming Milestones</a:t>
-            </a:r>
-          </a:p>
-        </p:txBody>
-      </p:sp>
+              <a:t>Results: Persistence Diagram Distances</a:t>
+            </a:r>
+          </a:p>
+        </p:txBody>
+      </p:sp>
+      <p:pic>
+        <p:nvPicPr>
+          <p:cNvPr id="2" name="Picture 1">
+            <a:extLst>
+              <a:ext uri="{FF2B5EF4-FFF2-40B4-BE49-F238E27FC236}">
+                <a16:creationId xmlns:a16="http://schemas.microsoft.com/office/drawing/2014/main" id="{9786DA3F-D6E1-4B1A-BE56-C5EF47FE491C}"/>
+              </a:ext>
+            </a:extLst>
+          </p:cNvPr>
+          <p:cNvPicPr>
+            <a:picLocks noChangeAspect="1"/>
+          </p:cNvPicPr>
+          <p:nvPr/>
+        </p:nvPicPr>
+        <p:blipFill>
+          <a:blip r:embed="rId4"/>
+          <a:stretch>
+            <a:fillRect/>
+          </a:stretch>
+        </p:blipFill>
+        <p:spPr>
+          <a:xfrm>
+            <a:off x="745174" y="1381284"/>
+            <a:ext cx="6683924" cy="4886326"/>
+          </a:xfrm>
+          <a:prstGeom prst="rect">
+            <a:avLst/>
+          </a:prstGeom>
+        </p:spPr>
+      </p:pic>
     </p:spTree>
     <p:extLst>
       <p:ext uri="{BB962C8B-B14F-4D97-AF65-F5344CB8AC3E}">
-        <p14:creationId xmlns:p14="http://schemas.microsoft.com/office/powerpoint/2010/main" val="1259270546"/>
+        <p14:creationId xmlns:p14="http://schemas.microsoft.com/office/powerpoint/2010/main" val="2042230145"/>
       </p:ext>
     </p:extLst>
   </p:cSld>

</xml_diff>